<commit_message>
Lesson 2.Git Local Deep Dive 基本原理詳解 -16
</commit_message>
<xml_diff>
--- a/Git_GitHub_GitLab 完全教程.pptx
+++ b/Git_GitHub_GitLab 完全教程.pptx
@@ -6,7 +6,12 @@
   </p:sldMasterIdLst>
   <p:sldIdLst>
     <p:sldId id="257" r:id="rId2"/>
-    <p:sldId id="258" r:id="rId3"/>
+    <p:sldId id="259" r:id="rId3"/>
+    <p:sldId id="260" r:id="rId4"/>
+    <p:sldId id="262" r:id="rId5"/>
+    <p:sldId id="263" r:id="rId6"/>
+    <p:sldId id="261" r:id="rId7"/>
+    <p:sldId id="258" r:id="rId8"/>
   </p:sldIdLst>
   <p:sldSz cx="12192000" cy="6858000"/>
   <p:notesSz cx="6858000" cy="9144000"/>
@@ -260,7 +265,7 @@
           <a:p>
             <a:fld id="{73162AC5-E67B-4DF6-AF32-28625A1B7BDF}" type="datetimeFigureOut">
               <a:rPr lang="zh-TW" altLang="en-US" smtClean="0"/>
-              <a:t>2022/12/26</a:t>
+              <a:t>2023/1/2</a:t>
             </a:fld>
             <a:endParaRPr lang="zh-TW" altLang="en-US"/>
           </a:p>
@@ -458,7 +463,7 @@
           <a:p>
             <a:fld id="{73162AC5-E67B-4DF6-AF32-28625A1B7BDF}" type="datetimeFigureOut">
               <a:rPr lang="zh-TW" altLang="en-US" smtClean="0"/>
-              <a:t>2022/12/26</a:t>
+              <a:t>2023/1/2</a:t>
             </a:fld>
             <a:endParaRPr lang="zh-TW" altLang="en-US"/>
           </a:p>
@@ -666,7 +671,7 @@
           <a:p>
             <a:fld id="{73162AC5-E67B-4DF6-AF32-28625A1B7BDF}" type="datetimeFigureOut">
               <a:rPr lang="zh-TW" altLang="en-US" smtClean="0"/>
-              <a:t>2022/12/26</a:t>
+              <a:t>2023/1/2</a:t>
             </a:fld>
             <a:endParaRPr lang="zh-TW" altLang="en-US"/>
           </a:p>
@@ -864,7 +869,7 @@
           <a:p>
             <a:fld id="{73162AC5-E67B-4DF6-AF32-28625A1B7BDF}" type="datetimeFigureOut">
               <a:rPr lang="zh-TW" altLang="en-US" smtClean="0"/>
-              <a:t>2022/12/26</a:t>
+              <a:t>2023/1/2</a:t>
             </a:fld>
             <a:endParaRPr lang="zh-TW" altLang="en-US"/>
           </a:p>
@@ -1139,7 +1144,7 @@
           <a:p>
             <a:fld id="{73162AC5-E67B-4DF6-AF32-28625A1B7BDF}" type="datetimeFigureOut">
               <a:rPr lang="zh-TW" altLang="en-US" smtClean="0"/>
-              <a:t>2022/12/26</a:t>
+              <a:t>2023/1/2</a:t>
             </a:fld>
             <a:endParaRPr lang="zh-TW" altLang="en-US"/>
           </a:p>
@@ -1404,7 +1409,7 @@
           <a:p>
             <a:fld id="{73162AC5-E67B-4DF6-AF32-28625A1B7BDF}" type="datetimeFigureOut">
               <a:rPr lang="zh-TW" altLang="en-US" smtClean="0"/>
-              <a:t>2022/12/26</a:t>
+              <a:t>2023/1/2</a:t>
             </a:fld>
             <a:endParaRPr lang="zh-TW" altLang="en-US"/>
           </a:p>
@@ -1816,7 +1821,7 @@
           <a:p>
             <a:fld id="{73162AC5-E67B-4DF6-AF32-28625A1B7BDF}" type="datetimeFigureOut">
               <a:rPr lang="zh-TW" altLang="en-US" smtClean="0"/>
-              <a:t>2022/12/26</a:t>
+              <a:t>2023/1/2</a:t>
             </a:fld>
             <a:endParaRPr lang="zh-TW" altLang="en-US"/>
           </a:p>
@@ -1957,7 +1962,7 @@
           <a:p>
             <a:fld id="{73162AC5-E67B-4DF6-AF32-28625A1B7BDF}" type="datetimeFigureOut">
               <a:rPr lang="zh-TW" altLang="en-US" smtClean="0"/>
-              <a:t>2022/12/26</a:t>
+              <a:t>2023/1/2</a:t>
             </a:fld>
             <a:endParaRPr lang="zh-TW" altLang="en-US"/>
           </a:p>
@@ -2070,7 +2075,7 @@
           <a:p>
             <a:fld id="{73162AC5-E67B-4DF6-AF32-28625A1B7BDF}" type="datetimeFigureOut">
               <a:rPr lang="zh-TW" altLang="en-US" smtClean="0"/>
-              <a:t>2022/12/26</a:t>
+              <a:t>2023/1/2</a:t>
             </a:fld>
             <a:endParaRPr lang="zh-TW" altLang="en-US"/>
           </a:p>
@@ -2381,7 +2386,7 @@
           <a:p>
             <a:fld id="{73162AC5-E67B-4DF6-AF32-28625A1B7BDF}" type="datetimeFigureOut">
               <a:rPr lang="zh-TW" altLang="en-US" smtClean="0"/>
-              <a:t>2022/12/26</a:t>
+              <a:t>2023/1/2</a:t>
             </a:fld>
             <a:endParaRPr lang="zh-TW" altLang="en-US"/>
           </a:p>
@@ -2669,7 +2674,7 @@
           <a:p>
             <a:fld id="{73162AC5-E67B-4DF6-AF32-28625A1B7BDF}" type="datetimeFigureOut">
               <a:rPr lang="zh-TW" altLang="en-US" smtClean="0"/>
-              <a:t>2022/12/26</a:t>
+              <a:t>2023/1/2</a:t>
             </a:fld>
             <a:endParaRPr lang="zh-TW" altLang="en-US"/>
           </a:p>
@@ -2910,7 +2915,7 @@
           <a:p>
             <a:fld id="{73162AC5-E67B-4DF6-AF32-28625A1B7BDF}" type="datetimeFigureOut">
               <a:rPr lang="zh-TW" altLang="en-US" smtClean="0"/>
-              <a:t>2022/12/26</a:t>
+              <a:t>2023/1/2</a:t>
             </a:fld>
             <a:endParaRPr lang="zh-TW" altLang="en-US"/>
           </a:p>
@@ -3581,6 +3586,586 @@
           <p:cNvPr id="2" name="標題 1">
             <a:extLst>
               <a:ext uri="{FF2B5EF4-FFF2-40B4-BE49-F238E27FC236}">
+                <a16:creationId xmlns:a16="http://schemas.microsoft.com/office/drawing/2014/main" id="{5372AFFF-60CD-690D-1A9C-68C538495384}"/>
+              </a:ext>
+            </a:extLst>
+          </p:cNvPr>
+          <p:cNvSpPr>
+            <a:spLocks noGrp="1"/>
+          </p:cNvSpPr>
+          <p:nvPr>
+            <p:ph type="title"/>
+          </p:nvPr>
+        </p:nvSpPr>
+        <p:spPr/>
+        <p:txBody>
+          <a:bodyPr/>
+          <a:lstStyle/>
+          <a:p>
+            <a:endParaRPr lang="zh-TW" altLang="en-US"/>
+          </a:p>
+        </p:txBody>
+      </p:sp>
+      <p:sp>
+        <p:nvSpPr>
+          <p:cNvPr id="3" name="內容版面配置區 2">
+            <a:extLst>
+              <a:ext uri="{FF2B5EF4-FFF2-40B4-BE49-F238E27FC236}">
+                <a16:creationId xmlns:a16="http://schemas.microsoft.com/office/drawing/2014/main" id="{2D21C0D9-EF76-EED8-98FA-3A95207E40C1}"/>
+              </a:ext>
+            </a:extLst>
+          </p:cNvPr>
+          <p:cNvSpPr>
+            <a:spLocks noGrp="1"/>
+          </p:cNvSpPr>
+          <p:nvPr>
+            <p:ph idx="1"/>
+          </p:nvPr>
+        </p:nvSpPr>
+        <p:spPr/>
+        <p:txBody>
+          <a:bodyPr/>
+          <a:lstStyle/>
+          <a:p>
+            <a:r>
+              <a:rPr lang="en-US" altLang="zh-TW" dirty="0"/>
+              <a:t>git config --global user.name "Paul Huang“</a:t>
+            </a:r>
+          </a:p>
+          <a:p>
+            <a:r>
+              <a:rPr lang="en-US" altLang="zh-TW" dirty="0"/>
+              <a:t>git config --global </a:t>
+            </a:r>
+            <a:r>
+              <a:rPr lang="en-US" altLang="zh-TW" dirty="0" err="1"/>
+              <a:t>user.email</a:t>
+            </a:r>
+            <a:r>
+              <a:rPr lang="en-US" altLang="zh-TW" dirty="0"/>
+              <a:t> </a:t>
+            </a:r>
+            <a:r>
+              <a:rPr lang="en-US" altLang="zh-TW" dirty="0">
+                <a:hlinkClick r:id="rId2"/>
+              </a:rPr>
+              <a:t>paul19890524@gmail.com</a:t>
+            </a:r>
+            <a:endParaRPr lang="en-US" altLang="zh-TW" dirty="0"/>
+          </a:p>
+          <a:p>
+            <a:r>
+              <a:rPr lang="en-US" altLang="zh-TW" dirty="0"/>
+              <a:t>git config –l</a:t>
+            </a:r>
+          </a:p>
+          <a:p>
+            <a:pPr lvl="1"/>
+            <a:r>
+              <a:rPr lang="zh-TW" altLang="en-US" dirty="0"/>
+              <a:t>檢查 </a:t>
+            </a:r>
+            <a:r>
+              <a:rPr lang="en-US" altLang="zh-TW" dirty="0"/>
+              <a:t>config </a:t>
+            </a:r>
+            <a:r>
+              <a:rPr lang="zh-TW" altLang="en-US" dirty="0"/>
+              <a:t>內容</a:t>
+            </a:r>
+          </a:p>
+        </p:txBody>
+      </p:sp>
+    </p:spTree>
+    <p:extLst>
+      <p:ext uri="{BB962C8B-B14F-4D97-AF65-F5344CB8AC3E}">
+        <p14:creationId xmlns:p14="http://schemas.microsoft.com/office/powerpoint/2010/main" val="113693821"/>
+      </p:ext>
+    </p:extLst>
+  </p:cSld>
+  <p:clrMapOvr>
+    <a:masterClrMapping/>
+  </p:clrMapOvr>
+</p:sld>
+</file>
+
+<file path=ppt/slides/slide3.xml><?xml version="1.0" encoding="utf-8"?>
+<p:sld xmlns:a="http://schemas.openxmlformats.org/drawingml/2006/main" xmlns:r="http://schemas.openxmlformats.org/officeDocument/2006/relationships" xmlns:p="http://schemas.openxmlformats.org/presentationml/2006/main">
+  <p:cSld>
+    <p:spTree>
+      <p:nvGrpSpPr>
+        <p:cNvPr id="1" name=""/>
+        <p:cNvGrpSpPr/>
+        <p:nvPr/>
+      </p:nvGrpSpPr>
+      <p:grpSpPr>
+        <a:xfrm>
+          <a:off x="0" y="0"/>
+          <a:ext cx="0" cy="0"/>
+          <a:chOff x="0" y="0"/>
+          <a:chExt cx="0" cy="0"/>
+        </a:xfrm>
+      </p:grpSpPr>
+      <p:sp>
+        <p:nvSpPr>
+          <p:cNvPr id="2" name="標題 1">
+            <a:extLst>
+              <a:ext uri="{FF2B5EF4-FFF2-40B4-BE49-F238E27FC236}">
+                <a16:creationId xmlns:a16="http://schemas.microsoft.com/office/drawing/2014/main" id="{62622A49-242E-5B49-BD5B-A9A04F7E5C8A}"/>
+              </a:ext>
+            </a:extLst>
+          </p:cNvPr>
+          <p:cNvSpPr>
+            <a:spLocks noGrp="1"/>
+          </p:cNvSpPr>
+          <p:nvPr>
+            <p:ph type="title"/>
+          </p:nvPr>
+        </p:nvSpPr>
+        <p:spPr/>
+        <p:txBody>
+          <a:bodyPr/>
+          <a:lstStyle/>
+          <a:p>
+            <a:r>
+              <a:rPr lang="en-US" altLang="zh-TW" dirty="0"/>
+              <a:t>Git check </a:t>
+            </a:r>
+            <a:r>
+              <a:rPr lang="zh-TW" altLang="en-US" dirty="0"/>
+              <a:t>指令</a:t>
+            </a:r>
+          </a:p>
+        </p:txBody>
+      </p:sp>
+      <p:sp>
+        <p:nvSpPr>
+          <p:cNvPr id="3" name="內容版面配置區 2">
+            <a:extLst>
+              <a:ext uri="{FF2B5EF4-FFF2-40B4-BE49-F238E27FC236}">
+                <a16:creationId xmlns:a16="http://schemas.microsoft.com/office/drawing/2014/main" id="{E7727E41-2D3F-A991-3AA4-51064025B700}"/>
+              </a:ext>
+            </a:extLst>
+          </p:cNvPr>
+          <p:cNvSpPr>
+            <a:spLocks noGrp="1"/>
+          </p:cNvSpPr>
+          <p:nvPr>
+            <p:ph idx="1"/>
+          </p:nvPr>
+        </p:nvSpPr>
+        <p:spPr/>
+        <p:txBody>
+          <a:bodyPr>
+            <a:normAutofit lnSpcReduction="10000"/>
+          </a:bodyPr>
+          <a:lstStyle/>
+          <a:p>
+            <a:r>
+              <a:rPr lang="en-US" altLang="zh-TW" dirty="0"/>
+              <a:t>Git object</a:t>
+            </a:r>
+          </a:p>
+          <a:p>
+            <a:r>
+              <a:rPr lang="en-US" altLang="zh-TW" dirty="0"/>
+              <a:t>git cat-file -t</a:t>
+            </a:r>
+          </a:p>
+          <a:p>
+            <a:pPr lvl="1"/>
+            <a:r>
+              <a:rPr lang="zh-TW" altLang="en-US" dirty="0"/>
+              <a:t>查看</a:t>
+            </a:r>
+            <a:r>
+              <a:rPr lang="en-US" altLang="zh-TW" dirty="0"/>
+              <a:t>object</a:t>
+            </a:r>
+            <a:r>
+              <a:rPr lang="zh-TW" altLang="en-US" dirty="0"/>
+              <a:t>類型</a:t>
+            </a:r>
+            <a:endParaRPr lang="en-US" altLang="zh-TW" dirty="0"/>
+          </a:p>
+          <a:p>
+            <a:r>
+              <a:rPr lang="en-US" altLang="zh-TW" dirty="0"/>
+              <a:t>git cat-file -p</a:t>
+            </a:r>
+          </a:p>
+          <a:p>
+            <a:pPr lvl="1"/>
+            <a:r>
+              <a:rPr lang="zh-TW" altLang="en-US" dirty="0"/>
+              <a:t>查看</a:t>
+            </a:r>
+            <a:r>
+              <a:rPr lang="en-US" altLang="zh-TW" dirty="0"/>
+              <a:t>object</a:t>
+            </a:r>
+            <a:r>
+              <a:rPr lang="zh-TW" altLang="en-US" dirty="0"/>
+              <a:t>內容</a:t>
+            </a:r>
+            <a:endParaRPr lang="en-US" altLang="zh-TW" dirty="0"/>
+          </a:p>
+          <a:p>
+            <a:r>
+              <a:rPr lang="en-US" altLang="zh-TW" dirty="0"/>
+              <a:t>git cat-file -s</a:t>
+            </a:r>
+          </a:p>
+          <a:p>
+            <a:pPr lvl="1"/>
+            <a:r>
+              <a:rPr lang="zh-TW" altLang="en-US" dirty="0"/>
+              <a:t>查看</a:t>
+            </a:r>
+            <a:r>
+              <a:rPr lang="en-US" altLang="zh-TW" dirty="0"/>
+              <a:t>object</a:t>
+            </a:r>
+            <a:r>
+              <a:rPr lang="zh-TW" altLang="en-US" dirty="0"/>
+              <a:t>大小</a:t>
+            </a:r>
+            <a:endParaRPr lang="en-US" altLang="zh-TW" dirty="0"/>
+          </a:p>
+          <a:p>
+            <a:r>
+              <a:rPr lang="en-US" altLang="zh-TW" dirty="0"/>
+              <a:t>track</a:t>
+            </a:r>
+          </a:p>
+          <a:p>
+            <a:pPr lvl="1"/>
+            <a:r>
+              <a:rPr lang="zh-TW" altLang="en-US" dirty="0"/>
+              <a:t>文件內容 </a:t>
+            </a:r>
+            <a:r>
+              <a:rPr lang="en-US" altLang="zh-TW" dirty="0"/>
+              <a:t>=&gt; Sha1</a:t>
+            </a:r>
+            <a:r>
+              <a:rPr lang="zh-TW" altLang="en-US" dirty="0"/>
+              <a:t>加密</a:t>
+            </a:r>
+            <a:endParaRPr lang="en-US" altLang="zh-TW" dirty="0"/>
+          </a:p>
+          <a:p>
+            <a:pPr lvl="1"/>
+            <a:r>
+              <a:rPr lang="zh-TW" altLang="en-US" dirty="0"/>
+              <a:t>加密字串 </a:t>
+            </a:r>
+            <a:r>
+              <a:rPr lang="en-US" altLang="zh-TW" dirty="0"/>
+              <a:t>:</a:t>
+            </a:r>
+            <a:r>
+              <a:rPr lang="zh-TW" altLang="en-US" dirty="0"/>
+              <a:t> </a:t>
+            </a:r>
+            <a:r>
+              <a:rPr lang="en-US" altLang="zh-TW" dirty="0"/>
+              <a:t>“blob size\0 </a:t>
+            </a:r>
+            <a:r>
+              <a:rPr lang="zh-TW" altLang="en-US" dirty="0"/>
+              <a:t>文件內容</a:t>
+            </a:r>
+            <a:r>
+              <a:rPr lang="en-US" altLang="zh-TW" dirty="0"/>
+              <a:t>”</a:t>
+            </a:r>
+            <a:endParaRPr lang="zh-TW" altLang="en-US" dirty="0"/>
+          </a:p>
+        </p:txBody>
+      </p:sp>
+    </p:spTree>
+    <p:extLst>
+      <p:ext uri="{BB962C8B-B14F-4D97-AF65-F5344CB8AC3E}">
+        <p14:creationId xmlns:p14="http://schemas.microsoft.com/office/powerpoint/2010/main" val="1076343773"/>
+      </p:ext>
+    </p:extLst>
+  </p:cSld>
+  <p:clrMapOvr>
+    <a:masterClrMapping/>
+  </p:clrMapOvr>
+</p:sld>
+</file>
+
+<file path=ppt/slides/slide4.xml><?xml version="1.0" encoding="utf-8"?>
+<p:sld xmlns:a="http://schemas.openxmlformats.org/drawingml/2006/main" xmlns:r="http://schemas.openxmlformats.org/officeDocument/2006/relationships" xmlns:p="http://schemas.openxmlformats.org/presentationml/2006/main">
+  <p:cSld>
+    <p:spTree>
+      <p:nvGrpSpPr>
+        <p:cNvPr id="1" name=""/>
+        <p:cNvGrpSpPr/>
+        <p:nvPr/>
+      </p:nvGrpSpPr>
+      <p:grpSpPr>
+        <a:xfrm>
+          <a:off x="0" y="0"/>
+          <a:ext cx="0" cy="0"/>
+          <a:chOff x="0" y="0"/>
+          <a:chExt cx="0" cy="0"/>
+        </a:xfrm>
+      </p:grpSpPr>
+      <p:pic>
+        <p:nvPicPr>
+          <p:cNvPr id="5" name="內容版面配置區 4">
+            <a:extLst>
+              <a:ext uri="{FF2B5EF4-FFF2-40B4-BE49-F238E27FC236}">
+                <a16:creationId xmlns:a16="http://schemas.microsoft.com/office/drawing/2014/main" id="{6A57E961-970D-9E57-5292-6FF7E079C5A9}"/>
+              </a:ext>
+            </a:extLst>
+          </p:cNvPr>
+          <p:cNvPicPr>
+            <a:picLocks noGrp="1" noChangeAspect="1"/>
+          </p:cNvPicPr>
+          <p:nvPr>
+            <p:ph idx="1"/>
+          </p:nvPr>
+        </p:nvPicPr>
+        <p:blipFill>
+          <a:blip r:embed="rId2"/>
+          <a:stretch>
+            <a:fillRect/>
+          </a:stretch>
+        </p:blipFill>
+        <p:spPr>
+          <a:xfrm>
+            <a:off x="1328737" y="1315244"/>
+            <a:ext cx="9534525" cy="4105275"/>
+          </a:xfrm>
+        </p:spPr>
+      </p:pic>
+    </p:spTree>
+    <p:extLst>
+      <p:ext uri="{BB962C8B-B14F-4D97-AF65-F5344CB8AC3E}">
+        <p14:creationId xmlns:p14="http://schemas.microsoft.com/office/powerpoint/2010/main" val="1198695630"/>
+      </p:ext>
+    </p:extLst>
+  </p:cSld>
+  <p:clrMapOvr>
+    <a:masterClrMapping/>
+  </p:clrMapOvr>
+</p:sld>
+</file>
+
+<file path=ppt/slides/slide5.xml><?xml version="1.0" encoding="utf-8"?>
+<p:sld xmlns:a="http://schemas.openxmlformats.org/drawingml/2006/main" xmlns:r="http://schemas.openxmlformats.org/officeDocument/2006/relationships" xmlns:p="http://schemas.openxmlformats.org/presentationml/2006/main">
+  <p:cSld>
+    <p:spTree>
+      <p:nvGrpSpPr>
+        <p:cNvPr id="1" name=""/>
+        <p:cNvGrpSpPr/>
+        <p:nvPr/>
+      </p:nvGrpSpPr>
+      <p:grpSpPr>
+        <a:xfrm>
+          <a:off x="0" y="0"/>
+          <a:ext cx="0" cy="0"/>
+          <a:chOff x="0" y="0"/>
+          <a:chExt cx="0" cy="0"/>
+        </a:xfrm>
+      </p:grpSpPr>
+      <p:sp>
+        <p:nvSpPr>
+          <p:cNvPr id="2" name="標題 1">
+            <a:extLst>
+              <a:ext uri="{FF2B5EF4-FFF2-40B4-BE49-F238E27FC236}">
+                <a16:creationId xmlns:a16="http://schemas.microsoft.com/office/drawing/2014/main" id="{81E02953-EAB7-9E5A-DB89-39B0FFB4D6F6}"/>
+              </a:ext>
+            </a:extLst>
+          </p:cNvPr>
+          <p:cNvSpPr>
+            <a:spLocks noGrp="1"/>
+          </p:cNvSpPr>
+          <p:nvPr>
+            <p:ph type="title"/>
+          </p:nvPr>
+        </p:nvSpPr>
+        <p:spPr/>
+        <p:txBody>
+          <a:bodyPr/>
+          <a:lstStyle/>
+          <a:p>
+            <a:endParaRPr lang="zh-TW" altLang="en-US"/>
+          </a:p>
+        </p:txBody>
+      </p:sp>
+      <p:sp>
+        <p:nvSpPr>
+          <p:cNvPr id="3" name="內容版面配置區 2">
+            <a:extLst>
+              <a:ext uri="{FF2B5EF4-FFF2-40B4-BE49-F238E27FC236}">
+                <a16:creationId xmlns:a16="http://schemas.microsoft.com/office/drawing/2014/main" id="{39C54992-6ADC-F603-DD54-2B2D2B9DBAB4}"/>
+              </a:ext>
+            </a:extLst>
+          </p:cNvPr>
+          <p:cNvSpPr>
+            <a:spLocks noGrp="1"/>
+          </p:cNvSpPr>
+          <p:nvPr>
+            <p:ph idx="1"/>
+          </p:nvPr>
+        </p:nvSpPr>
+        <p:spPr/>
+        <p:txBody>
+          <a:bodyPr/>
+          <a:lstStyle/>
+          <a:p>
+            <a:r>
+              <a:rPr lang="en-US" altLang="zh-TW" dirty="0"/>
+              <a:t>git ls-files</a:t>
+            </a:r>
+          </a:p>
+          <a:p>
+            <a:r>
+              <a:rPr lang="en-US" altLang="zh-TW" dirty="0"/>
+              <a:t>git ls-files -s</a:t>
+            </a:r>
+            <a:endParaRPr lang="zh-TW" altLang="en-US" dirty="0"/>
+          </a:p>
+        </p:txBody>
+      </p:sp>
+    </p:spTree>
+    <p:extLst>
+      <p:ext uri="{BB962C8B-B14F-4D97-AF65-F5344CB8AC3E}">
+        <p14:creationId xmlns:p14="http://schemas.microsoft.com/office/powerpoint/2010/main" val="2190909539"/>
+      </p:ext>
+    </p:extLst>
+  </p:cSld>
+  <p:clrMapOvr>
+    <a:masterClrMapping/>
+  </p:clrMapOvr>
+</p:sld>
+</file>
+
+<file path=ppt/slides/slide6.xml><?xml version="1.0" encoding="utf-8"?>
+<p:sld xmlns:a="http://schemas.openxmlformats.org/drawingml/2006/main" xmlns:r="http://schemas.openxmlformats.org/officeDocument/2006/relationships" xmlns:p="http://schemas.openxmlformats.org/presentationml/2006/main">
+  <p:cSld>
+    <p:spTree>
+      <p:nvGrpSpPr>
+        <p:cNvPr id="1" name=""/>
+        <p:cNvGrpSpPr/>
+        <p:nvPr/>
+      </p:nvGrpSpPr>
+      <p:grpSpPr>
+        <a:xfrm>
+          <a:off x="0" y="0"/>
+          <a:ext cx="0" cy="0"/>
+          <a:chOff x="0" y="0"/>
+          <a:chExt cx="0" cy="0"/>
+        </a:xfrm>
+      </p:grpSpPr>
+      <p:sp>
+        <p:nvSpPr>
+          <p:cNvPr id="2" name="標題 1">
+            <a:extLst>
+              <a:ext uri="{FF2B5EF4-FFF2-40B4-BE49-F238E27FC236}">
+                <a16:creationId xmlns:a16="http://schemas.microsoft.com/office/drawing/2014/main" id="{08FFB9B3-AF50-155F-8140-E7889C6FDACB}"/>
+              </a:ext>
+            </a:extLst>
+          </p:cNvPr>
+          <p:cNvSpPr>
+            <a:spLocks noGrp="1"/>
+          </p:cNvSpPr>
+          <p:nvPr>
+            <p:ph type="title"/>
+          </p:nvPr>
+        </p:nvSpPr>
+        <p:spPr/>
+        <p:txBody>
+          <a:bodyPr/>
+          <a:lstStyle/>
+          <a:p>
+            <a:endParaRPr lang="zh-TW" altLang="en-US"/>
+          </a:p>
+        </p:txBody>
+      </p:sp>
+      <p:sp>
+        <p:nvSpPr>
+          <p:cNvPr id="3" name="內容版面配置區 2">
+            <a:extLst>
+              <a:ext uri="{FF2B5EF4-FFF2-40B4-BE49-F238E27FC236}">
+                <a16:creationId xmlns:a16="http://schemas.microsoft.com/office/drawing/2014/main" id="{327073AC-86AF-C41F-D1EF-F14A0B70B2CA}"/>
+              </a:ext>
+            </a:extLst>
+          </p:cNvPr>
+          <p:cNvSpPr>
+            <a:spLocks noGrp="1"/>
+          </p:cNvSpPr>
+          <p:nvPr>
+            <p:ph idx="1"/>
+          </p:nvPr>
+        </p:nvSpPr>
+        <p:spPr/>
+        <p:txBody>
+          <a:bodyPr/>
+          <a:lstStyle/>
+          <a:p>
+            <a:r>
+              <a:rPr lang="en-US" altLang="zh-TW" dirty="0"/>
+              <a:t>Docker =&gt; sha256</a:t>
+            </a:r>
+          </a:p>
+          <a:p>
+            <a:pPr lvl="1"/>
+            <a:r>
+              <a:rPr lang="en-US" altLang="zh-TW" dirty="0" err="1"/>
+              <a:t>dockerimage</a:t>
+            </a:r>
+            <a:endParaRPr lang="en-US" altLang="zh-TW" dirty="0"/>
+          </a:p>
+          <a:p>
+            <a:pPr lvl="1"/>
+            <a:r>
+              <a:rPr lang="en-US" altLang="zh-TW" dirty="0"/>
+              <a:t>container id</a:t>
+            </a:r>
+          </a:p>
+        </p:txBody>
+      </p:sp>
+    </p:spTree>
+    <p:extLst>
+      <p:ext uri="{BB962C8B-B14F-4D97-AF65-F5344CB8AC3E}">
+        <p14:creationId xmlns:p14="http://schemas.microsoft.com/office/powerpoint/2010/main" val="688929695"/>
+      </p:ext>
+    </p:extLst>
+  </p:cSld>
+  <p:clrMapOvr>
+    <a:masterClrMapping/>
+  </p:clrMapOvr>
+</p:sld>
+</file>
+
+<file path=ppt/slides/slide7.xml><?xml version="1.0" encoding="utf-8"?>
+<p:sld xmlns:a="http://schemas.openxmlformats.org/drawingml/2006/main" xmlns:r="http://schemas.openxmlformats.org/officeDocument/2006/relationships" xmlns:p="http://schemas.openxmlformats.org/presentationml/2006/main">
+  <p:cSld>
+    <p:spTree>
+      <p:nvGrpSpPr>
+        <p:cNvPr id="1" name=""/>
+        <p:cNvGrpSpPr/>
+        <p:nvPr/>
+      </p:nvGrpSpPr>
+      <p:grpSpPr>
+        <a:xfrm>
+          <a:off x="0" y="0"/>
+          <a:ext cx="0" cy="0"/>
+          <a:chOff x="0" y="0"/>
+          <a:chExt cx="0" cy="0"/>
+        </a:xfrm>
+      </p:grpSpPr>
+      <p:sp>
+        <p:nvSpPr>
+          <p:cNvPr id="2" name="標題 1">
+            <a:extLst>
+              <a:ext uri="{FF2B5EF4-FFF2-40B4-BE49-F238E27FC236}">
                 <a16:creationId xmlns:a16="http://schemas.microsoft.com/office/drawing/2014/main" id="{95E0F80C-E02E-873B-6A11-29EE7F4E65B5}"/>
               </a:ext>
             </a:extLst>

</xml_diff>

<commit_message>
Lesson 2.Git Local Deep Dive 基本原理詳解 -17-19
</commit_message>
<xml_diff>
--- a/Git_GitHub_GitLab 完全教程.pptx
+++ b/Git_GitHub_GitLab 完全教程.pptx
@@ -11,7 +11,10 @@
     <p:sldId id="262" r:id="rId5"/>
     <p:sldId id="263" r:id="rId6"/>
     <p:sldId id="261" r:id="rId7"/>
-    <p:sldId id="258" r:id="rId8"/>
+    <p:sldId id="264" r:id="rId8"/>
+    <p:sldId id="267" r:id="rId9"/>
+    <p:sldId id="266" r:id="rId10"/>
+    <p:sldId id="258" r:id="rId11"/>
   </p:sldIdLst>
   <p:sldSz cx="12192000" cy="6858000"/>
   <p:notesSz cx="6858000" cy="9144000"/>
@@ -265,7 +268,7 @@
           <a:p>
             <a:fld id="{73162AC5-E67B-4DF6-AF32-28625A1B7BDF}" type="datetimeFigureOut">
               <a:rPr lang="zh-TW" altLang="en-US" smtClean="0"/>
-              <a:t>2023/1/2</a:t>
+              <a:t>2023/9/13</a:t>
             </a:fld>
             <a:endParaRPr lang="zh-TW" altLang="en-US"/>
           </a:p>
@@ -463,7 +466,7 @@
           <a:p>
             <a:fld id="{73162AC5-E67B-4DF6-AF32-28625A1B7BDF}" type="datetimeFigureOut">
               <a:rPr lang="zh-TW" altLang="en-US" smtClean="0"/>
-              <a:t>2023/1/2</a:t>
+              <a:t>2023/9/13</a:t>
             </a:fld>
             <a:endParaRPr lang="zh-TW" altLang="en-US"/>
           </a:p>
@@ -671,7 +674,7 @@
           <a:p>
             <a:fld id="{73162AC5-E67B-4DF6-AF32-28625A1B7BDF}" type="datetimeFigureOut">
               <a:rPr lang="zh-TW" altLang="en-US" smtClean="0"/>
-              <a:t>2023/1/2</a:t>
+              <a:t>2023/9/13</a:t>
             </a:fld>
             <a:endParaRPr lang="zh-TW" altLang="en-US"/>
           </a:p>
@@ -869,7 +872,7 @@
           <a:p>
             <a:fld id="{73162AC5-E67B-4DF6-AF32-28625A1B7BDF}" type="datetimeFigureOut">
               <a:rPr lang="zh-TW" altLang="en-US" smtClean="0"/>
-              <a:t>2023/1/2</a:t>
+              <a:t>2023/9/13</a:t>
             </a:fld>
             <a:endParaRPr lang="zh-TW" altLang="en-US"/>
           </a:p>
@@ -1144,7 +1147,7 @@
           <a:p>
             <a:fld id="{73162AC5-E67B-4DF6-AF32-28625A1B7BDF}" type="datetimeFigureOut">
               <a:rPr lang="zh-TW" altLang="en-US" smtClean="0"/>
-              <a:t>2023/1/2</a:t>
+              <a:t>2023/9/13</a:t>
             </a:fld>
             <a:endParaRPr lang="zh-TW" altLang="en-US"/>
           </a:p>
@@ -1409,7 +1412,7 @@
           <a:p>
             <a:fld id="{73162AC5-E67B-4DF6-AF32-28625A1B7BDF}" type="datetimeFigureOut">
               <a:rPr lang="zh-TW" altLang="en-US" smtClean="0"/>
-              <a:t>2023/1/2</a:t>
+              <a:t>2023/9/13</a:t>
             </a:fld>
             <a:endParaRPr lang="zh-TW" altLang="en-US"/>
           </a:p>
@@ -1821,7 +1824,7 @@
           <a:p>
             <a:fld id="{73162AC5-E67B-4DF6-AF32-28625A1B7BDF}" type="datetimeFigureOut">
               <a:rPr lang="zh-TW" altLang="en-US" smtClean="0"/>
-              <a:t>2023/1/2</a:t>
+              <a:t>2023/9/13</a:t>
             </a:fld>
             <a:endParaRPr lang="zh-TW" altLang="en-US"/>
           </a:p>
@@ -1962,7 +1965,7 @@
           <a:p>
             <a:fld id="{73162AC5-E67B-4DF6-AF32-28625A1B7BDF}" type="datetimeFigureOut">
               <a:rPr lang="zh-TW" altLang="en-US" smtClean="0"/>
-              <a:t>2023/1/2</a:t>
+              <a:t>2023/9/13</a:t>
             </a:fld>
             <a:endParaRPr lang="zh-TW" altLang="en-US"/>
           </a:p>
@@ -2075,7 +2078,7 @@
           <a:p>
             <a:fld id="{73162AC5-E67B-4DF6-AF32-28625A1B7BDF}" type="datetimeFigureOut">
               <a:rPr lang="zh-TW" altLang="en-US" smtClean="0"/>
-              <a:t>2023/1/2</a:t>
+              <a:t>2023/9/13</a:t>
             </a:fld>
             <a:endParaRPr lang="zh-TW" altLang="en-US"/>
           </a:p>
@@ -2386,7 +2389,7 @@
           <a:p>
             <a:fld id="{73162AC5-E67B-4DF6-AF32-28625A1B7BDF}" type="datetimeFigureOut">
               <a:rPr lang="zh-TW" altLang="en-US" smtClean="0"/>
-              <a:t>2023/1/2</a:t>
+              <a:t>2023/9/13</a:t>
             </a:fld>
             <a:endParaRPr lang="zh-TW" altLang="en-US"/>
           </a:p>
@@ -2674,7 +2677,7 @@
           <a:p>
             <a:fld id="{73162AC5-E67B-4DF6-AF32-28625A1B7BDF}" type="datetimeFigureOut">
               <a:rPr lang="zh-TW" altLang="en-US" smtClean="0"/>
-              <a:t>2023/1/2</a:t>
+              <a:t>2023/9/13</a:t>
             </a:fld>
             <a:endParaRPr lang="zh-TW" altLang="en-US"/>
           </a:p>
@@ -2915,7 +2918,7 @@
           <a:p>
             <a:fld id="{73162AC5-E67B-4DF6-AF32-28625A1B7BDF}" type="datetimeFigureOut">
               <a:rPr lang="zh-TW" altLang="en-US" smtClean="0"/>
-              <a:t>2023/1/2</a:t>
+              <a:t>2023/9/13</a:t>
             </a:fld>
             <a:endParaRPr lang="zh-TW" altLang="en-US"/>
           </a:p>
@@ -3564,6 +3567,94 @@
 </p:sld>
 </file>
 
+<file path=ppt/slides/slide10.xml><?xml version="1.0" encoding="utf-8"?>
+<p:sld xmlns:a="http://schemas.openxmlformats.org/drawingml/2006/main" xmlns:r="http://schemas.openxmlformats.org/officeDocument/2006/relationships" xmlns:p="http://schemas.openxmlformats.org/presentationml/2006/main">
+  <p:cSld>
+    <p:spTree>
+      <p:nvGrpSpPr>
+        <p:cNvPr id="1" name=""/>
+        <p:cNvGrpSpPr/>
+        <p:nvPr/>
+      </p:nvGrpSpPr>
+      <p:grpSpPr>
+        <a:xfrm>
+          <a:off x="0" y="0"/>
+          <a:ext cx="0" cy="0"/>
+          <a:chOff x="0" y="0"/>
+          <a:chExt cx="0" cy="0"/>
+        </a:xfrm>
+      </p:grpSpPr>
+      <p:sp>
+        <p:nvSpPr>
+          <p:cNvPr id="2" name="標題 1">
+            <a:extLst>
+              <a:ext uri="{FF2B5EF4-FFF2-40B4-BE49-F238E27FC236}">
+                <a16:creationId xmlns:a16="http://schemas.microsoft.com/office/drawing/2014/main" id="{95E0F80C-E02E-873B-6A11-29EE7F4E65B5}"/>
+              </a:ext>
+            </a:extLst>
+          </p:cNvPr>
+          <p:cNvSpPr>
+            <a:spLocks noGrp="1"/>
+          </p:cNvSpPr>
+          <p:nvPr>
+            <p:ph type="title"/>
+          </p:nvPr>
+        </p:nvSpPr>
+        <p:spPr/>
+        <p:txBody>
+          <a:bodyPr/>
+          <a:lstStyle/>
+          <a:p>
+            <a:pPr algn="ctr"/>
+            <a:r>
+              <a:rPr lang="zh-TW" altLang="en-US" dirty="0"/>
+              <a:t>補充資料</a:t>
+            </a:r>
+          </a:p>
+        </p:txBody>
+      </p:sp>
+      <p:sp>
+        <p:nvSpPr>
+          <p:cNvPr id="3" name="內容版面配置區 2">
+            <a:extLst>
+              <a:ext uri="{FF2B5EF4-FFF2-40B4-BE49-F238E27FC236}">
+                <a16:creationId xmlns:a16="http://schemas.microsoft.com/office/drawing/2014/main" id="{156EF5FA-9777-B4CB-52E7-8411970F2277}"/>
+              </a:ext>
+            </a:extLst>
+          </p:cNvPr>
+          <p:cNvSpPr>
+            <a:spLocks noGrp="1"/>
+          </p:cNvSpPr>
+          <p:nvPr>
+            <p:ph idx="1"/>
+          </p:nvPr>
+        </p:nvSpPr>
+        <p:spPr/>
+        <p:txBody>
+          <a:bodyPr/>
+          <a:lstStyle/>
+          <a:p>
+            <a:r>
+              <a:rPr lang="en-US" altLang="zh-TW" dirty="0"/>
+              <a:t>https://www.escapelife.site/posts/da89563c.html</a:t>
+            </a:r>
+            <a:endParaRPr lang="zh-TW" altLang="en-US" dirty="0"/>
+          </a:p>
+        </p:txBody>
+      </p:sp>
+    </p:spTree>
+    <p:extLst>
+      <p:ext uri="{BB962C8B-B14F-4D97-AF65-F5344CB8AC3E}">
+        <p14:creationId xmlns:p14="http://schemas.microsoft.com/office/powerpoint/2010/main" val="2904343814"/>
+      </p:ext>
+    </p:extLst>
+  </p:cSld>
+  <p:clrMapOvr>
+    <a:masterClrMapping/>
+  </p:clrMapOvr>
+</p:sld>
+</file>
+
 <file path=ppt/slides/slide2.xml><?xml version="1.0" encoding="utf-8"?>
 <p:sld xmlns:a="http://schemas.openxmlformats.org/drawingml/2006/main" xmlns:r="http://schemas.openxmlformats.org/officeDocument/2006/relationships" xmlns:p="http://schemas.openxmlformats.org/presentationml/2006/main">
   <p:cSld>
@@ -4166,7 +4257,7 @@
           <p:cNvPr id="2" name="標題 1">
             <a:extLst>
               <a:ext uri="{FF2B5EF4-FFF2-40B4-BE49-F238E27FC236}">
-                <a16:creationId xmlns:a16="http://schemas.microsoft.com/office/drawing/2014/main" id="{95E0F80C-E02E-873B-6A11-29EE7F4E65B5}"/>
+                <a16:creationId xmlns:a16="http://schemas.microsoft.com/office/drawing/2014/main" id="{66D6E4DA-879F-B5A1-A0B7-A4134ABA0892}"/>
               </a:ext>
             </a:extLst>
           </p:cNvPr>
@@ -4182,47 +4273,228 @@
           <a:bodyPr/>
           <a:lstStyle/>
           <a:p>
-            <a:pPr algn="ctr"/>
-            <a:r>
-              <a:rPr lang="zh-TW" altLang="en-US" dirty="0"/>
-              <a:t>補充資料</a:t>
-            </a:r>
-          </a:p>
-        </p:txBody>
-      </p:sp>
-      <p:sp>
-        <p:nvSpPr>
-          <p:cNvPr id="3" name="內容版面配置區 2">
-            <a:extLst>
-              <a:ext uri="{FF2B5EF4-FFF2-40B4-BE49-F238E27FC236}">
-                <a16:creationId xmlns:a16="http://schemas.microsoft.com/office/drawing/2014/main" id="{156EF5FA-9777-B4CB-52E7-8411970F2277}"/>
-              </a:ext>
-            </a:extLst>
-          </p:cNvPr>
-          <p:cNvSpPr>
-            <a:spLocks noGrp="1"/>
-          </p:cNvSpPr>
+            <a:r>
+              <a:rPr lang="en-US" altLang="zh-TW" dirty="0"/>
+              <a:t>Commit flow-1</a:t>
+            </a:r>
+            <a:endParaRPr lang="zh-TW" altLang="en-US" dirty="0"/>
+          </a:p>
+        </p:txBody>
+      </p:sp>
+      <p:pic>
+        <p:nvPicPr>
+          <p:cNvPr id="5" name="內容版面配置區 4">
+            <a:extLst>
+              <a:ext uri="{FF2B5EF4-FFF2-40B4-BE49-F238E27FC236}">
+                <a16:creationId xmlns:a16="http://schemas.microsoft.com/office/drawing/2014/main" id="{12F2FB46-6AA4-FDF3-7C51-D2AFE6A6A2DF}"/>
+              </a:ext>
+            </a:extLst>
+          </p:cNvPr>
+          <p:cNvPicPr>
+            <a:picLocks noGrp="1" noChangeAspect="1"/>
+          </p:cNvPicPr>
           <p:nvPr>
             <p:ph idx="1"/>
           </p:nvPr>
-        </p:nvSpPr>
-        <p:spPr/>
-        <p:txBody>
-          <a:bodyPr/>
-          <a:lstStyle/>
-          <a:p>
-            <a:r>
-              <a:rPr lang="en-US" altLang="zh-TW" dirty="0"/>
-              <a:t>https://www.escapelife.site/posts/da89563c.html</a:t>
-            </a:r>
-            <a:endParaRPr lang="zh-TW" altLang="en-US" dirty="0"/>
-          </a:p>
-        </p:txBody>
-      </p:sp>
+        </p:nvPicPr>
+        <p:blipFill>
+          <a:blip r:embed="rId2"/>
+          <a:stretch>
+            <a:fillRect/>
+          </a:stretch>
+        </p:blipFill>
+        <p:spPr>
+          <a:xfrm>
+            <a:off x="1748540" y="1825625"/>
+            <a:ext cx="8694919" cy="4351338"/>
+          </a:xfrm>
+        </p:spPr>
+      </p:pic>
     </p:spTree>
     <p:extLst>
       <p:ext uri="{BB962C8B-B14F-4D97-AF65-F5344CB8AC3E}">
-        <p14:creationId xmlns:p14="http://schemas.microsoft.com/office/powerpoint/2010/main" val="2904343814"/>
+        <p14:creationId xmlns:p14="http://schemas.microsoft.com/office/powerpoint/2010/main" val="841698014"/>
+      </p:ext>
+    </p:extLst>
+  </p:cSld>
+  <p:clrMapOvr>
+    <a:masterClrMapping/>
+  </p:clrMapOvr>
+</p:sld>
+</file>
+
+<file path=ppt/slides/slide8.xml><?xml version="1.0" encoding="utf-8"?>
+<p:sld xmlns:a="http://schemas.openxmlformats.org/drawingml/2006/main" xmlns:r="http://schemas.openxmlformats.org/officeDocument/2006/relationships" xmlns:p="http://schemas.openxmlformats.org/presentationml/2006/main">
+  <p:cSld>
+    <p:spTree>
+      <p:nvGrpSpPr>
+        <p:cNvPr id="1" name=""/>
+        <p:cNvGrpSpPr/>
+        <p:nvPr/>
+      </p:nvGrpSpPr>
+      <p:grpSpPr>
+        <a:xfrm>
+          <a:off x="0" y="0"/>
+          <a:ext cx="0" cy="0"/>
+          <a:chOff x="0" y="0"/>
+          <a:chExt cx="0" cy="0"/>
+        </a:xfrm>
+      </p:grpSpPr>
+      <p:sp>
+        <p:nvSpPr>
+          <p:cNvPr id="2" name="標題 1">
+            <a:extLst>
+              <a:ext uri="{FF2B5EF4-FFF2-40B4-BE49-F238E27FC236}">
+                <a16:creationId xmlns:a16="http://schemas.microsoft.com/office/drawing/2014/main" id="{1B2B540D-0658-6EA9-7D34-B5CF8D900C59}"/>
+              </a:ext>
+            </a:extLst>
+          </p:cNvPr>
+          <p:cNvSpPr>
+            <a:spLocks noGrp="1"/>
+          </p:cNvSpPr>
+          <p:nvPr>
+            <p:ph type="title"/>
+          </p:nvPr>
+        </p:nvSpPr>
+        <p:spPr/>
+        <p:txBody>
+          <a:bodyPr/>
+          <a:lstStyle/>
+          <a:p>
+            <a:r>
+              <a:rPr lang="en-US" altLang="zh-TW" dirty="0"/>
+              <a:t>Commit flow-2</a:t>
+            </a:r>
+            <a:endParaRPr lang="zh-TW" altLang="en-US" dirty="0"/>
+          </a:p>
+        </p:txBody>
+      </p:sp>
+      <p:pic>
+        <p:nvPicPr>
+          <p:cNvPr id="5" name="內容版面配置區 4">
+            <a:extLst>
+              <a:ext uri="{FF2B5EF4-FFF2-40B4-BE49-F238E27FC236}">
+                <a16:creationId xmlns:a16="http://schemas.microsoft.com/office/drawing/2014/main" id="{F0FE7CC7-1886-698B-7D95-4E7FB3E0DED5}"/>
+              </a:ext>
+            </a:extLst>
+          </p:cNvPr>
+          <p:cNvPicPr>
+            <a:picLocks noGrp="1" noChangeAspect="1"/>
+          </p:cNvPicPr>
+          <p:nvPr>
+            <p:ph idx="1"/>
+          </p:nvPr>
+        </p:nvPicPr>
+        <p:blipFill>
+          <a:blip r:embed="rId2"/>
+          <a:stretch>
+            <a:fillRect/>
+          </a:stretch>
+        </p:blipFill>
+        <p:spPr>
+          <a:xfrm>
+            <a:off x="2389567" y="1825625"/>
+            <a:ext cx="7412865" cy="4351338"/>
+          </a:xfrm>
+        </p:spPr>
+      </p:pic>
+    </p:spTree>
+    <p:extLst>
+      <p:ext uri="{BB962C8B-B14F-4D97-AF65-F5344CB8AC3E}">
+        <p14:creationId xmlns:p14="http://schemas.microsoft.com/office/powerpoint/2010/main" val="2136413430"/>
+      </p:ext>
+    </p:extLst>
+  </p:cSld>
+  <p:clrMapOvr>
+    <a:masterClrMapping/>
+  </p:clrMapOvr>
+</p:sld>
+</file>
+
+<file path=ppt/slides/slide9.xml><?xml version="1.0" encoding="utf-8"?>
+<p:sld xmlns:a="http://schemas.openxmlformats.org/drawingml/2006/main" xmlns:r="http://schemas.openxmlformats.org/officeDocument/2006/relationships" xmlns:p="http://schemas.openxmlformats.org/presentationml/2006/main">
+  <p:cSld>
+    <p:spTree>
+      <p:nvGrpSpPr>
+        <p:cNvPr id="1" name=""/>
+        <p:cNvGrpSpPr/>
+        <p:nvPr/>
+      </p:nvGrpSpPr>
+      <p:grpSpPr>
+        <a:xfrm>
+          <a:off x="0" y="0"/>
+          <a:ext cx="0" cy="0"/>
+          <a:chOff x="0" y="0"/>
+          <a:chExt cx="0" cy="0"/>
+        </a:xfrm>
+      </p:grpSpPr>
+      <p:sp>
+        <p:nvSpPr>
+          <p:cNvPr id="2" name="標題 1">
+            <a:extLst>
+              <a:ext uri="{FF2B5EF4-FFF2-40B4-BE49-F238E27FC236}">
+                <a16:creationId xmlns:a16="http://schemas.microsoft.com/office/drawing/2014/main" id="{6A408214-DA5D-8603-7154-452EA758B6EE}"/>
+              </a:ext>
+            </a:extLst>
+          </p:cNvPr>
+          <p:cNvSpPr>
+            <a:spLocks noGrp="1"/>
+          </p:cNvSpPr>
+          <p:nvPr>
+            <p:ph type="title"/>
+          </p:nvPr>
+        </p:nvSpPr>
+        <p:spPr>
+          <a:xfrm>
+            <a:off x="838200" y="365125"/>
+            <a:ext cx="10116845" cy="794673"/>
+          </a:xfrm>
+        </p:spPr>
+        <p:txBody>
+          <a:bodyPr/>
+          <a:lstStyle/>
+          <a:p>
+            <a:r>
+              <a:rPr lang="en-US" altLang="zh-TW" dirty="0"/>
+              <a:t>Commit flow-3</a:t>
+            </a:r>
+            <a:endParaRPr lang="zh-TW" altLang="en-US" dirty="0"/>
+          </a:p>
+        </p:txBody>
+      </p:sp>
+      <p:pic>
+        <p:nvPicPr>
+          <p:cNvPr id="7" name="內容版面配置區 6">
+            <a:extLst>
+              <a:ext uri="{FF2B5EF4-FFF2-40B4-BE49-F238E27FC236}">
+                <a16:creationId xmlns:a16="http://schemas.microsoft.com/office/drawing/2014/main" id="{C2995A2D-AC06-3A1C-CF7D-373F4F389636}"/>
+              </a:ext>
+            </a:extLst>
+          </p:cNvPr>
+          <p:cNvPicPr>
+            <a:picLocks noGrp="1" noChangeAspect="1"/>
+          </p:cNvPicPr>
+          <p:nvPr>
+            <p:ph idx="1"/>
+          </p:nvPr>
+        </p:nvPicPr>
+        <p:blipFill>
+          <a:blip r:embed="rId2"/>
+          <a:stretch>
+            <a:fillRect/>
+          </a:stretch>
+        </p:blipFill>
+        <p:spPr>
+          <a:xfrm>
+            <a:off x="2079061" y="1159798"/>
+            <a:ext cx="7366780" cy="5165987"/>
+          </a:xfrm>
+        </p:spPr>
+      </p:pic>
+    </p:spTree>
+    <p:extLst>
+      <p:ext uri="{BB962C8B-B14F-4D97-AF65-F5344CB8AC3E}">
+        <p14:creationId xmlns:p14="http://schemas.microsoft.com/office/powerpoint/2010/main" val="2563811398"/>
       </p:ext>
     </p:extLst>
   </p:cSld>

</xml_diff>

<commit_message>
Lesson 2.Git Local Deep Dive 基本原理詳解 -20
</commit_message>
<xml_diff>
--- a/Git_GitHub_GitLab 完全教程.pptx
+++ b/Git_GitHub_GitLab 完全教程.pptx
@@ -14,7 +14,8 @@
     <p:sldId id="264" r:id="rId8"/>
     <p:sldId id="267" r:id="rId9"/>
     <p:sldId id="266" r:id="rId10"/>
-    <p:sldId id="258" r:id="rId11"/>
+    <p:sldId id="265" r:id="rId11"/>
+    <p:sldId id="258" r:id="rId12"/>
   </p:sldIdLst>
   <p:sldSz cx="12192000" cy="6858000"/>
   <p:notesSz cx="6858000" cy="9144000"/>
@@ -3589,6 +3590,102 @@
           <p:cNvPr id="2" name="標題 1">
             <a:extLst>
               <a:ext uri="{FF2B5EF4-FFF2-40B4-BE49-F238E27FC236}">
+                <a16:creationId xmlns:a16="http://schemas.microsoft.com/office/drawing/2014/main" id="{83615992-28E3-8C03-33C0-92454F634206}"/>
+              </a:ext>
+            </a:extLst>
+          </p:cNvPr>
+          <p:cNvSpPr>
+            <a:spLocks noGrp="1"/>
+          </p:cNvSpPr>
+          <p:nvPr>
+            <p:ph type="title"/>
+          </p:nvPr>
+        </p:nvSpPr>
+        <p:spPr>
+          <a:xfrm>
+            <a:off x="838200" y="365125"/>
+            <a:ext cx="10515600" cy="753461"/>
+          </a:xfrm>
+        </p:spPr>
+        <p:txBody>
+          <a:bodyPr/>
+          <a:lstStyle/>
+          <a:p>
+            <a:r>
+              <a:rPr lang="en-US" altLang="zh-TW" dirty="0"/>
+              <a:t>Git </a:t>
+            </a:r>
+            <a:r>
+              <a:rPr lang="zh-TW" altLang="en-US" dirty="0"/>
+              <a:t>的文件狀態</a:t>
+            </a:r>
+          </a:p>
+        </p:txBody>
+      </p:sp>
+      <p:pic>
+        <p:nvPicPr>
+          <p:cNvPr id="5" name="內容版面配置區 4">
+            <a:extLst>
+              <a:ext uri="{FF2B5EF4-FFF2-40B4-BE49-F238E27FC236}">
+                <a16:creationId xmlns:a16="http://schemas.microsoft.com/office/drawing/2014/main" id="{6C18BB36-CAFE-8F97-7E83-DADDD8EB5CC2}"/>
+              </a:ext>
+            </a:extLst>
+          </p:cNvPr>
+          <p:cNvPicPr>
+            <a:picLocks noGrp="1" noChangeAspect="1"/>
+          </p:cNvPicPr>
+          <p:nvPr>
+            <p:ph idx="1"/>
+          </p:nvPr>
+        </p:nvPicPr>
+        <p:blipFill>
+          <a:blip r:embed="rId2"/>
+          <a:stretch>
+            <a:fillRect/>
+          </a:stretch>
+        </p:blipFill>
+        <p:spPr>
+          <a:xfrm>
+            <a:off x="1290637" y="1347788"/>
+            <a:ext cx="9610725" cy="4600575"/>
+          </a:xfrm>
+        </p:spPr>
+      </p:pic>
+    </p:spTree>
+    <p:extLst>
+      <p:ext uri="{BB962C8B-B14F-4D97-AF65-F5344CB8AC3E}">
+        <p14:creationId xmlns:p14="http://schemas.microsoft.com/office/powerpoint/2010/main" val="2289198793"/>
+      </p:ext>
+    </p:extLst>
+  </p:cSld>
+  <p:clrMapOvr>
+    <a:masterClrMapping/>
+  </p:clrMapOvr>
+</p:sld>
+</file>
+
+<file path=ppt/slides/slide11.xml><?xml version="1.0" encoding="utf-8"?>
+<p:sld xmlns:a="http://schemas.openxmlformats.org/drawingml/2006/main" xmlns:r="http://schemas.openxmlformats.org/officeDocument/2006/relationships" xmlns:p="http://schemas.openxmlformats.org/presentationml/2006/main">
+  <p:cSld>
+    <p:spTree>
+      <p:nvGrpSpPr>
+        <p:cNvPr id="1" name=""/>
+        <p:cNvGrpSpPr/>
+        <p:nvPr/>
+      </p:nvGrpSpPr>
+      <p:grpSpPr>
+        <a:xfrm>
+          <a:off x="0" y="0"/>
+          <a:ext cx="0" cy="0"/>
+          <a:chOff x="0" y="0"/>
+          <a:chExt cx="0" cy="0"/>
+        </a:xfrm>
+      </p:grpSpPr>
+      <p:sp>
+        <p:nvSpPr>
+          <p:cNvPr id="2" name="標題 1">
+            <a:extLst>
+              <a:ext uri="{FF2B5EF4-FFF2-40B4-BE49-F238E27FC236}">
                 <a16:creationId xmlns:a16="http://schemas.microsoft.com/office/drawing/2014/main" id="{95E0F80C-E02E-873B-6A11-29EE7F4E65B5}"/>
               </a:ext>
             </a:extLst>

</xml_diff>

<commit_message>
release 分支 & tag
</commit_message>
<xml_diff>
--- a/Git_GitHub_GitLab 完全教程.pptx
+++ b/Git_GitHub_GitLab 完全教程.pptx
@@ -9,13 +9,19 @@
     <p:sldId id="259" r:id="rId3"/>
     <p:sldId id="260" r:id="rId4"/>
     <p:sldId id="262" r:id="rId5"/>
-    <p:sldId id="263" r:id="rId6"/>
-    <p:sldId id="261" r:id="rId7"/>
-    <p:sldId id="264" r:id="rId8"/>
-    <p:sldId id="267" r:id="rId9"/>
-    <p:sldId id="266" r:id="rId10"/>
-    <p:sldId id="265" r:id="rId11"/>
-    <p:sldId id="258" r:id="rId12"/>
+    <p:sldId id="264" r:id="rId6"/>
+    <p:sldId id="267" r:id="rId7"/>
+    <p:sldId id="266" r:id="rId8"/>
+    <p:sldId id="265" r:id="rId9"/>
+    <p:sldId id="268" r:id="rId10"/>
+    <p:sldId id="269" r:id="rId11"/>
+    <p:sldId id="271" r:id="rId12"/>
+    <p:sldId id="270" r:id="rId13"/>
+    <p:sldId id="272" r:id="rId14"/>
+    <p:sldId id="273" r:id="rId15"/>
+    <p:sldId id="274" r:id="rId16"/>
+    <p:sldId id="275" r:id="rId17"/>
+    <p:sldId id="258" r:id="rId18"/>
   </p:sldIdLst>
   <p:sldSz cx="12192000" cy="6858000"/>
   <p:notesSz cx="6858000" cy="9144000"/>
@@ -269,7 +275,7 @@
           <a:p>
             <a:fld id="{73162AC5-E67B-4DF6-AF32-28625A1B7BDF}" type="datetimeFigureOut">
               <a:rPr lang="zh-TW" altLang="en-US" smtClean="0"/>
-              <a:t>2023/9/13</a:t>
+              <a:t>2023/12/26</a:t>
             </a:fld>
             <a:endParaRPr lang="zh-TW" altLang="en-US"/>
           </a:p>
@@ -467,7 +473,7 @@
           <a:p>
             <a:fld id="{73162AC5-E67B-4DF6-AF32-28625A1B7BDF}" type="datetimeFigureOut">
               <a:rPr lang="zh-TW" altLang="en-US" smtClean="0"/>
-              <a:t>2023/9/13</a:t>
+              <a:t>2023/12/26</a:t>
             </a:fld>
             <a:endParaRPr lang="zh-TW" altLang="en-US"/>
           </a:p>
@@ -675,7 +681,7 @@
           <a:p>
             <a:fld id="{73162AC5-E67B-4DF6-AF32-28625A1B7BDF}" type="datetimeFigureOut">
               <a:rPr lang="zh-TW" altLang="en-US" smtClean="0"/>
-              <a:t>2023/9/13</a:t>
+              <a:t>2023/12/26</a:t>
             </a:fld>
             <a:endParaRPr lang="zh-TW" altLang="en-US"/>
           </a:p>
@@ -873,7 +879,7 @@
           <a:p>
             <a:fld id="{73162AC5-E67B-4DF6-AF32-28625A1B7BDF}" type="datetimeFigureOut">
               <a:rPr lang="zh-TW" altLang="en-US" smtClean="0"/>
-              <a:t>2023/9/13</a:t>
+              <a:t>2023/12/26</a:t>
             </a:fld>
             <a:endParaRPr lang="zh-TW" altLang="en-US"/>
           </a:p>
@@ -1148,7 +1154,7 @@
           <a:p>
             <a:fld id="{73162AC5-E67B-4DF6-AF32-28625A1B7BDF}" type="datetimeFigureOut">
               <a:rPr lang="zh-TW" altLang="en-US" smtClean="0"/>
-              <a:t>2023/9/13</a:t>
+              <a:t>2023/12/26</a:t>
             </a:fld>
             <a:endParaRPr lang="zh-TW" altLang="en-US"/>
           </a:p>
@@ -1413,7 +1419,7 @@
           <a:p>
             <a:fld id="{73162AC5-E67B-4DF6-AF32-28625A1B7BDF}" type="datetimeFigureOut">
               <a:rPr lang="zh-TW" altLang="en-US" smtClean="0"/>
-              <a:t>2023/9/13</a:t>
+              <a:t>2023/12/26</a:t>
             </a:fld>
             <a:endParaRPr lang="zh-TW" altLang="en-US"/>
           </a:p>
@@ -1825,7 +1831,7 @@
           <a:p>
             <a:fld id="{73162AC5-E67B-4DF6-AF32-28625A1B7BDF}" type="datetimeFigureOut">
               <a:rPr lang="zh-TW" altLang="en-US" smtClean="0"/>
-              <a:t>2023/9/13</a:t>
+              <a:t>2023/12/26</a:t>
             </a:fld>
             <a:endParaRPr lang="zh-TW" altLang="en-US"/>
           </a:p>
@@ -1966,7 +1972,7 @@
           <a:p>
             <a:fld id="{73162AC5-E67B-4DF6-AF32-28625A1B7BDF}" type="datetimeFigureOut">
               <a:rPr lang="zh-TW" altLang="en-US" smtClean="0"/>
-              <a:t>2023/9/13</a:t>
+              <a:t>2023/12/26</a:t>
             </a:fld>
             <a:endParaRPr lang="zh-TW" altLang="en-US"/>
           </a:p>
@@ -2079,7 +2085,7 @@
           <a:p>
             <a:fld id="{73162AC5-E67B-4DF6-AF32-28625A1B7BDF}" type="datetimeFigureOut">
               <a:rPr lang="zh-TW" altLang="en-US" smtClean="0"/>
-              <a:t>2023/9/13</a:t>
+              <a:t>2023/12/26</a:t>
             </a:fld>
             <a:endParaRPr lang="zh-TW" altLang="en-US"/>
           </a:p>
@@ -2390,7 +2396,7 @@
           <a:p>
             <a:fld id="{73162AC5-E67B-4DF6-AF32-28625A1B7BDF}" type="datetimeFigureOut">
               <a:rPr lang="zh-TW" altLang="en-US" smtClean="0"/>
-              <a:t>2023/9/13</a:t>
+              <a:t>2023/12/26</a:t>
             </a:fld>
             <a:endParaRPr lang="zh-TW" altLang="en-US"/>
           </a:p>
@@ -2678,7 +2684,7 @@
           <a:p>
             <a:fld id="{73162AC5-E67B-4DF6-AF32-28625A1B7BDF}" type="datetimeFigureOut">
               <a:rPr lang="zh-TW" altLang="en-US" smtClean="0"/>
-              <a:t>2023/9/13</a:t>
+              <a:t>2023/12/26</a:t>
             </a:fld>
             <a:endParaRPr lang="zh-TW" altLang="en-US"/>
           </a:p>
@@ -2919,7 +2925,7 @@
           <a:p>
             <a:fld id="{73162AC5-E67B-4DF6-AF32-28625A1B7BDF}" type="datetimeFigureOut">
               <a:rPr lang="zh-TW" altLang="en-US" smtClean="0"/>
-              <a:t>2023/9/13</a:t>
+              <a:t>2023/12/26</a:t>
             </a:fld>
             <a:endParaRPr lang="zh-TW" altLang="en-US"/>
           </a:p>
@@ -3585,49 +3591,12 @@
           <a:chExt cx="0" cy="0"/>
         </a:xfrm>
       </p:grpSpPr>
-      <p:sp>
-        <p:nvSpPr>
-          <p:cNvPr id="2" name="標題 1">
-            <a:extLst>
-              <a:ext uri="{FF2B5EF4-FFF2-40B4-BE49-F238E27FC236}">
-                <a16:creationId xmlns:a16="http://schemas.microsoft.com/office/drawing/2014/main" id="{83615992-28E3-8C03-33C0-92454F634206}"/>
-              </a:ext>
-            </a:extLst>
-          </p:cNvPr>
-          <p:cNvSpPr>
-            <a:spLocks noGrp="1"/>
-          </p:cNvSpPr>
-          <p:nvPr>
-            <p:ph type="title"/>
-          </p:nvPr>
-        </p:nvSpPr>
-        <p:spPr>
-          <a:xfrm>
-            <a:off x="838200" y="365125"/>
-            <a:ext cx="10515600" cy="753461"/>
-          </a:xfrm>
-        </p:spPr>
-        <p:txBody>
-          <a:bodyPr/>
-          <a:lstStyle/>
-          <a:p>
-            <a:r>
-              <a:rPr lang="en-US" altLang="zh-TW" dirty="0"/>
-              <a:t>Git </a:t>
-            </a:r>
-            <a:r>
-              <a:rPr lang="zh-TW" altLang="en-US" dirty="0"/>
-              <a:t>的文件狀態</a:t>
-            </a:r>
-          </a:p>
-        </p:txBody>
-      </p:sp>
       <p:pic>
         <p:nvPicPr>
           <p:cNvPr id="5" name="內容版面配置區 4">
             <a:extLst>
               <a:ext uri="{FF2B5EF4-FFF2-40B4-BE49-F238E27FC236}">
-                <a16:creationId xmlns:a16="http://schemas.microsoft.com/office/drawing/2014/main" id="{6C18BB36-CAFE-8F97-7E83-DADDD8EB5CC2}"/>
+                <a16:creationId xmlns:a16="http://schemas.microsoft.com/office/drawing/2014/main" id="{DD423DC1-A666-DAB1-AC4E-F1C18977A42A}"/>
               </a:ext>
             </a:extLst>
           </p:cNvPr>
@@ -3646,15 +3615,15 @@
         </p:blipFill>
         <p:spPr>
           <a:xfrm>
-            <a:off x="1290637" y="1347788"/>
-            <a:ext cx="9610725" cy="4600575"/>
+            <a:off x="702013" y="408372"/>
+            <a:ext cx="11158822" cy="5433135"/>
           </a:xfrm>
         </p:spPr>
       </p:pic>
     </p:spTree>
     <p:extLst>
       <p:ext uri="{BB962C8B-B14F-4D97-AF65-F5344CB8AC3E}">
-        <p14:creationId xmlns:p14="http://schemas.microsoft.com/office/powerpoint/2010/main" val="2289198793"/>
+        <p14:creationId xmlns:p14="http://schemas.microsoft.com/office/powerpoint/2010/main" val="3697508679"/>
       </p:ext>
     </p:extLst>
   </p:cSld>
@@ -3665,6 +3634,576 @@
 </file>
 
 <file path=ppt/slides/slide11.xml><?xml version="1.0" encoding="utf-8"?>
+<p:sld xmlns:a="http://schemas.openxmlformats.org/drawingml/2006/main" xmlns:r="http://schemas.openxmlformats.org/officeDocument/2006/relationships" xmlns:p="http://schemas.openxmlformats.org/presentationml/2006/main">
+  <p:cSld>
+    <p:spTree>
+      <p:nvGrpSpPr>
+        <p:cNvPr id="1" name=""/>
+        <p:cNvGrpSpPr/>
+        <p:nvPr/>
+      </p:nvGrpSpPr>
+      <p:grpSpPr>
+        <a:xfrm>
+          <a:off x="0" y="0"/>
+          <a:ext cx="0" cy="0"/>
+          <a:chOff x="0" y="0"/>
+          <a:chExt cx="0" cy="0"/>
+        </a:xfrm>
+      </p:grpSpPr>
+      <p:pic>
+        <p:nvPicPr>
+          <p:cNvPr id="5" name="內容版面配置區 4">
+            <a:extLst>
+              <a:ext uri="{FF2B5EF4-FFF2-40B4-BE49-F238E27FC236}">
+                <a16:creationId xmlns:a16="http://schemas.microsoft.com/office/drawing/2014/main" id="{06ABE977-DB12-545A-67B1-30B5AC8A6786}"/>
+              </a:ext>
+            </a:extLst>
+          </p:cNvPr>
+          <p:cNvPicPr>
+            <a:picLocks noGrp="1" noChangeAspect="1"/>
+          </p:cNvPicPr>
+          <p:nvPr>
+            <p:ph idx="1"/>
+          </p:nvPr>
+        </p:nvPicPr>
+        <p:blipFill>
+          <a:blip r:embed="rId2"/>
+          <a:stretch>
+            <a:fillRect/>
+          </a:stretch>
+        </p:blipFill>
+        <p:spPr>
+          <a:xfrm>
+            <a:off x="521568" y="156622"/>
+            <a:ext cx="10815215" cy="5839201"/>
+          </a:xfrm>
+        </p:spPr>
+      </p:pic>
+    </p:spTree>
+    <p:extLst>
+      <p:ext uri="{BB962C8B-B14F-4D97-AF65-F5344CB8AC3E}">
+        <p14:creationId xmlns:p14="http://schemas.microsoft.com/office/powerpoint/2010/main" val="3691854336"/>
+      </p:ext>
+    </p:extLst>
+  </p:cSld>
+  <p:clrMapOvr>
+    <a:masterClrMapping/>
+  </p:clrMapOvr>
+</p:sld>
+</file>
+
+<file path=ppt/slides/slide12.xml><?xml version="1.0" encoding="utf-8"?>
+<p:sld xmlns:a="http://schemas.openxmlformats.org/drawingml/2006/main" xmlns:r="http://schemas.openxmlformats.org/officeDocument/2006/relationships" xmlns:p="http://schemas.openxmlformats.org/presentationml/2006/main">
+  <p:cSld>
+    <p:spTree>
+      <p:nvGrpSpPr>
+        <p:cNvPr id="1" name=""/>
+        <p:cNvGrpSpPr/>
+        <p:nvPr/>
+      </p:nvGrpSpPr>
+      <p:grpSpPr>
+        <a:xfrm>
+          <a:off x="0" y="0"/>
+          <a:ext cx="0" cy="0"/>
+          <a:chOff x="0" y="0"/>
+          <a:chExt cx="0" cy="0"/>
+        </a:xfrm>
+      </p:grpSpPr>
+      <p:pic>
+        <p:nvPicPr>
+          <p:cNvPr id="16" name="內容版面配置區 15">
+            <a:extLst>
+              <a:ext uri="{FF2B5EF4-FFF2-40B4-BE49-F238E27FC236}">
+                <a16:creationId xmlns:a16="http://schemas.microsoft.com/office/drawing/2014/main" id="{51229517-1903-037B-678B-51AF07A21BF0}"/>
+              </a:ext>
+            </a:extLst>
+          </p:cNvPr>
+          <p:cNvPicPr>
+            <a:picLocks noGrp="1" noChangeAspect="1"/>
+          </p:cNvPicPr>
+          <p:nvPr>
+            <p:ph idx="1"/>
+          </p:nvPr>
+        </p:nvPicPr>
+        <p:blipFill>
+          <a:blip r:embed="rId2"/>
+          <a:stretch>
+            <a:fillRect/>
+          </a:stretch>
+        </p:blipFill>
+        <p:spPr>
+          <a:xfrm>
+            <a:off x="470414" y="360809"/>
+            <a:ext cx="11132701" cy="5571647"/>
+          </a:xfrm>
+          <a:prstGeom prst="rect">
+            <a:avLst/>
+          </a:prstGeom>
+        </p:spPr>
+      </p:pic>
+    </p:spTree>
+    <p:extLst>
+      <p:ext uri="{BB962C8B-B14F-4D97-AF65-F5344CB8AC3E}">
+        <p14:creationId xmlns:p14="http://schemas.microsoft.com/office/powerpoint/2010/main" val="2188795416"/>
+      </p:ext>
+    </p:extLst>
+  </p:cSld>
+  <p:clrMapOvr>
+    <a:masterClrMapping/>
+  </p:clrMapOvr>
+</p:sld>
+</file>
+
+<file path=ppt/slides/slide13.xml><?xml version="1.0" encoding="utf-8"?>
+<p:sld xmlns:a="http://schemas.openxmlformats.org/drawingml/2006/main" xmlns:r="http://schemas.openxmlformats.org/officeDocument/2006/relationships" xmlns:p="http://schemas.openxmlformats.org/presentationml/2006/main">
+  <p:cSld>
+    <p:spTree>
+      <p:nvGrpSpPr>
+        <p:cNvPr id="1" name=""/>
+        <p:cNvGrpSpPr/>
+        <p:nvPr/>
+      </p:nvGrpSpPr>
+      <p:grpSpPr>
+        <a:xfrm>
+          <a:off x="0" y="0"/>
+          <a:ext cx="0" cy="0"/>
+          <a:chOff x="0" y="0"/>
+          <a:chExt cx="0" cy="0"/>
+        </a:xfrm>
+      </p:grpSpPr>
+      <p:pic>
+        <p:nvPicPr>
+          <p:cNvPr id="5" name="內容版面配置區 4">
+            <a:extLst>
+              <a:ext uri="{FF2B5EF4-FFF2-40B4-BE49-F238E27FC236}">
+                <a16:creationId xmlns:a16="http://schemas.microsoft.com/office/drawing/2014/main" id="{BD7CD9F5-3096-0C0A-55BD-99B2A96CB18B}"/>
+              </a:ext>
+            </a:extLst>
+          </p:cNvPr>
+          <p:cNvPicPr>
+            <a:picLocks noGrp="1" noChangeAspect="1"/>
+          </p:cNvPicPr>
+          <p:nvPr>
+            <p:ph idx="1"/>
+          </p:nvPr>
+        </p:nvPicPr>
+        <p:blipFill>
+          <a:blip r:embed="rId2"/>
+          <a:stretch>
+            <a:fillRect/>
+          </a:stretch>
+        </p:blipFill>
+        <p:spPr>
+          <a:xfrm>
+            <a:off x="599591" y="387441"/>
+            <a:ext cx="10843134" cy="5569475"/>
+          </a:xfrm>
+        </p:spPr>
+      </p:pic>
+    </p:spTree>
+    <p:extLst>
+      <p:ext uri="{BB962C8B-B14F-4D97-AF65-F5344CB8AC3E}">
+        <p14:creationId xmlns:p14="http://schemas.microsoft.com/office/powerpoint/2010/main" val="543296188"/>
+      </p:ext>
+    </p:extLst>
+  </p:cSld>
+  <p:clrMapOvr>
+    <a:masterClrMapping/>
+  </p:clrMapOvr>
+</p:sld>
+</file>
+
+<file path=ppt/slides/slide14.xml><?xml version="1.0" encoding="utf-8"?>
+<p:sld xmlns:a="http://schemas.openxmlformats.org/drawingml/2006/main" xmlns:r="http://schemas.openxmlformats.org/officeDocument/2006/relationships" xmlns:p="http://schemas.openxmlformats.org/presentationml/2006/main">
+  <p:cSld>
+    <p:spTree>
+      <p:nvGrpSpPr>
+        <p:cNvPr id="1" name=""/>
+        <p:cNvGrpSpPr/>
+        <p:nvPr/>
+      </p:nvGrpSpPr>
+      <p:grpSpPr>
+        <a:xfrm>
+          <a:off x="0" y="0"/>
+          <a:ext cx="0" cy="0"/>
+          <a:chOff x="0" y="0"/>
+          <a:chExt cx="0" cy="0"/>
+        </a:xfrm>
+      </p:grpSpPr>
+      <p:sp>
+        <p:nvSpPr>
+          <p:cNvPr id="2" name="標題 1">
+            <a:extLst>
+              <a:ext uri="{FF2B5EF4-FFF2-40B4-BE49-F238E27FC236}">
+                <a16:creationId xmlns:a16="http://schemas.microsoft.com/office/drawing/2014/main" id="{69ACBD77-FC22-DDE0-4F7C-8B221B338CAA}"/>
+              </a:ext>
+            </a:extLst>
+          </p:cNvPr>
+          <p:cNvSpPr>
+            <a:spLocks noGrp="1"/>
+          </p:cNvSpPr>
+          <p:nvPr>
+            <p:ph type="title"/>
+          </p:nvPr>
+        </p:nvSpPr>
+        <p:spPr>
+          <a:xfrm>
+            <a:off x="838200" y="365125"/>
+            <a:ext cx="10515600" cy="1188467"/>
+          </a:xfrm>
+        </p:spPr>
+        <p:txBody>
+          <a:bodyPr/>
+          <a:lstStyle/>
+          <a:p>
+            <a:pPr algn="ctr"/>
+            <a:r>
+              <a:rPr lang="en-US" altLang="zh-TW" dirty="0"/>
+              <a:t>Git Remote</a:t>
+            </a:r>
+            <a:endParaRPr lang="zh-TW" altLang="en-US" dirty="0"/>
+          </a:p>
+        </p:txBody>
+      </p:sp>
+      <p:pic>
+        <p:nvPicPr>
+          <p:cNvPr id="5" name="內容版面配置區 4">
+            <a:extLst>
+              <a:ext uri="{FF2B5EF4-FFF2-40B4-BE49-F238E27FC236}">
+                <a16:creationId xmlns:a16="http://schemas.microsoft.com/office/drawing/2014/main" id="{99CA2A6A-0CDE-F46B-54A5-9490CFA60C19}"/>
+              </a:ext>
+            </a:extLst>
+          </p:cNvPr>
+          <p:cNvPicPr>
+            <a:picLocks noGrp="1" noChangeAspect="1"/>
+          </p:cNvPicPr>
+          <p:nvPr>
+            <p:ph idx="1"/>
+          </p:nvPr>
+        </p:nvPicPr>
+        <p:blipFill>
+          <a:blip r:embed="rId2"/>
+          <a:stretch>
+            <a:fillRect/>
+          </a:stretch>
+        </p:blipFill>
+        <p:spPr>
+          <a:xfrm>
+            <a:off x="2957486" y="1553591"/>
+            <a:ext cx="5991205" cy="4774435"/>
+          </a:xfrm>
+        </p:spPr>
+      </p:pic>
+    </p:spTree>
+    <p:extLst>
+      <p:ext uri="{BB962C8B-B14F-4D97-AF65-F5344CB8AC3E}">
+        <p14:creationId xmlns:p14="http://schemas.microsoft.com/office/powerpoint/2010/main" val="2461495671"/>
+      </p:ext>
+    </p:extLst>
+  </p:cSld>
+  <p:clrMapOvr>
+    <a:masterClrMapping/>
+  </p:clrMapOvr>
+</p:sld>
+</file>
+
+<file path=ppt/slides/slide15.xml><?xml version="1.0" encoding="utf-8"?>
+<p:sld xmlns:a="http://schemas.openxmlformats.org/drawingml/2006/main" xmlns:r="http://schemas.openxmlformats.org/officeDocument/2006/relationships" xmlns:p="http://schemas.openxmlformats.org/presentationml/2006/main">
+  <p:cSld>
+    <p:spTree>
+      <p:nvGrpSpPr>
+        <p:cNvPr id="1" name=""/>
+        <p:cNvGrpSpPr/>
+        <p:nvPr/>
+      </p:nvGrpSpPr>
+      <p:grpSpPr>
+        <a:xfrm>
+          <a:off x="0" y="0"/>
+          <a:ext cx="0" cy="0"/>
+          <a:chOff x="0" y="0"/>
+          <a:chExt cx="0" cy="0"/>
+        </a:xfrm>
+      </p:grpSpPr>
+      <p:sp>
+        <p:nvSpPr>
+          <p:cNvPr id="2" name="標題 1">
+            <a:extLst>
+              <a:ext uri="{FF2B5EF4-FFF2-40B4-BE49-F238E27FC236}">
+                <a16:creationId xmlns:a16="http://schemas.microsoft.com/office/drawing/2014/main" id="{9BD26B3C-4026-66C2-CCEA-FCEDDC4826C6}"/>
+              </a:ext>
+            </a:extLst>
+          </p:cNvPr>
+          <p:cNvSpPr>
+            <a:spLocks noGrp="1"/>
+          </p:cNvSpPr>
+          <p:nvPr>
+            <p:ph type="title"/>
+          </p:nvPr>
+        </p:nvSpPr>
+        <p:spPr>
+          <a:xfrm>
+            <a:off x="838200" y="365126"/>
+            <a:ext cx="10515600" cy="948770"/>
+          </a:xfrm>
+        </p:spPr>
+        <p:txBody>
+          <a:bodyPr>
+            <a:normAutofit/>
+          </a:bodyPr>
+          <a:lstStyle/>
+          <a:p>
+            <a:pPr algn="ctr"/>
+            <a:r>
+              <a:rPr lang="en-US" altLang="zh-TW" dirty="0"/>
+              <a:t>Git Tags</a:t>
+            </a:r>
+            <a:endParaRPr lang="zh-TW" altLang="en-US" dirty="0"/>
+          </a:p>
+        </p:txBody>
+      </p:sp>
+      <p:pic>
+        <p:nvPicPr>
+          <p:cNvPr id="5" name="內容版面配置區 4">
+            <a:extLst>
+              <a:ext uri="{FF2B5EF4-FFF2-40B4-BE49-F238E27FC236}">
+                <a16:creationId xmlns:a16="http://schemas.microsoft.com/office/drawing/2014/main" id="{59410473-5C61-EF52-D2FA-C68471521A3D}"/>
+              </a:ext>
+            </a:extLst>
+          </p:cNvPr>
+          <p:cNvPicPr>
+            <a:picLocks noGrp="1" noChangeAspect="1"/>
+          </p:cNvPicPr>
+          <p:nvPr>
+            <p:ph idx="1"/>
+          </p:nvPr>
+        </p:nvPicPr>
+        <p:blipFill>
+          <a:blip r:embed="rId2"/>
+          <a:stretch>
+            <a:fillRect/>
+          </a:stretch>
+        </p:blipFill>
+        <p:spPr>
+          <a:xfrm>
+            <a:off x="1587040" y="1411288"/>
+            <a:ext cx="9017920" cy="4765675"/>
+          </a:xfrm>
+        </p:spPr>
+      </p:pic>
+    </p:spTree>
+    <p:extLst>
+      <p:ext uri="{BB962C8B-B14F-4D97-AF65-F5344CB8AC3E}">
+        <p14:creationId xmlns:p14="http://schemas.microsoft.com/office/powerpoint/2010/main" val="3354188386"/>
+      </p:ext>
+    </p:extLst>
+  </p:cSld>
+  <p:clrMapOvr>
+    <a:masterClrMapping/>
+  </p:clrMapOvr>
+</p:sld>
+</file>
+
+<file path=ppt/slides/slide16.xml><?xml version="1.0" encoding="utf-8"?>
+<p:sld xmlns:a="http://schemas.openxmlformats.org/drawingml/2006/main" xmlns:r="http://schemas.openxmlformats.org/officeDocument/2006/relationships" xmlns:p="http://schemas.openxmlformats.org/presentationml/2006/main">
+  <p:cSld>
+    <p:spTree>
+      <p:nvGrpSpPr>
+        <p:cNvPr id="1" name=""/>
+        <p:cNvGrpSpPr/>
+        <p:nvPr/>
+      </p:nvGrpSpPr>
+      <p:grpSpPr>
+        <a:xfrm>
+          <a:off x="0" y="0"/>
+          <a:ext cx="0" cy="0"/>
+          <a:chOff x="0" y="0"/>
+          <a:chExt cx="0" cy="0"/>
+        </a:xfrm>
+      </p:grpSpPr>
+      <p:sp>
+        <p:nvSpPr>
+          <p:cNvPr id="2" name="標題 1">
+            <a:extLst>
+              <a:ext uri="{FF2B5EF4-FFF2-40B4-BE49-F238E27FC236}">
+                <a16:creationId xmlns:a16="http://schemas.microsoft.com/office/drawing/2014/main" id="{95F267FF-4890-A78E-3248-74EC27069917}"/>
+              </a:ext>
+            </a:extLst>
+          </p:cNvPr>
+          <p:cNvSpPr>
+            <a:spLocks noGrp="1"/>
+          </p:cNvSpPr>
+          <p:nvPr>
+            <p:ph type="title"/>
+          </p:nvPr>
+        </p:nvSpPr>
+        <p:spPr>
+          <a:xfrm>
+            <a:off x="838200" y="365126"/>
+            <a:ext cx="10515600" cy="833360"/>
+          </a:xfrm>
+        </p:spPr>
+        <p:txBody>
+          <a:bodyPr/>
+          <a:lstStyle/>
+          <a:p>
+            <a:pPr algn="ctr"/>
+            <a:r>
+              <a:rPr lang="zh-TW" altLang="en-US" dirty="0"/>
+              <a:t>比較常用的一種</a:t>
+            </a:r>
+            <a:r>
+              <a:rPr lang="en-US" altLang="zh-TW" dirty="0"/>
+              <a:t>tag</a:t>
+            </a:r>
+            <a:r>
+              <a:rPr lang="zh-TW" altLang="en-US" dirty="0"/>
+              <a:t>版本規劃</a:t>
+            </a:r>
+          </a:p>
+        </p:txBody>
+      </p:sp>
+      <p:sp>
+        <p:nvSpPr>
+          <p:cNvPr id="3" name="內容版面配置區 2">
+            <a:extLst>
+              <a:ext uri="{FF2B5EF4-FFF2-40B4-BE49-F238E27FC236}">
+                <a16:creationId xmlns:a16="http://schemas.microsoft.com/office/drawing/2014/main" id="{99F020D3-4AD0-B1E6-33F3-ABA8701F80FC}"/>
+              </a:ext>
+            </a:extLst>
+          </p:cNvPr>
+          <p:cNvSpPr>
+            <a:spLocks noGrp="1"/>
+          </p:cNvSpPr>
+          <p:nvPr>
+            <p:ph idx="1"/>
+          </p:nvPr>
+        </p:nvSpPr>
+        <p:spPr>
+          <a:xfrm>
+            <a:off x="838200" y="1198486"/>
+            <a:ext cx="10515600" cy="4978477"/>
+          </a:xfrm>
+        </p:spPr>
+        <p:txBody>
+          <a:bodyPr/>
+          <a:lstStyle/>
+          <a:p>
+            <a:r>
+              <a:rPr lang="en-US" altLang="zh-TW" dirty="0"/>
+              <a:t>A.B.C</a:t>
+            </a:r>
+          </a:p>
+          <a:p>
+            <a:pPr lvl="1"/>
+            <a:r>
+              <a:rPr lang="en-US" altLang="zh-TW" dirty="0"/>
+              <a:t>A:</a:t>
+            </a:r>
+            <a:r>
+              <a:rPr lang="zh-TW" altLang="en-US" dirty="0"/>
+              <a:t>大版本，大的 </a:t>
+            </a:r>
+            <a:r>
+              <a:rPr lang="en-US" altLang="zh-TW" dirty="0"/>
+              <a:t>feature </a:t>
+            </a:r>
+            <a:r>
+              <a:rPr lang="zh-TW" altLang="en-US" dirty="0"/>
+              <a:t>更新</a:t>
+            </a:r>
+            <a:endParaRPr lang="en-US" altLang="zh-TW" dirty="0"/>
+          </a:p>
+          <a:p>
+            <a:pPr lvl="1"/>
+            <a:r>
+              <a:rPr lang="en-US" altLang="zh-TW" dirty="0"/>
+              <a:t>B:</a:t>
+            </a:r>
+            <a:r>
+              <a:rPr lang="zh-TW" altLang="en-US" dirty="0"/>
+              <a:t>小版本，小的 </a:t>
+            </a:r>
+            <a:r>
+              <a:rPr lang="en-US" altLang="zh-TW" dirty="0"/>
+              <a:t>feature </a:t>
+            </a:r>
+            <a:r>
+              <a:rPr lang="zh-TW" altLang="en-US" dirty="0"/>
+              <a:t>更新</a:t>
+            </a:r>
+            <a:endParaRPr lang="en-US" altLang="zh-TW" dirty="0"/>
+          </a:p>
+          <a:p>
+            <a:pPr lvl="1"/>
+            <a:r>
+              <a:rPr lang="en-US" altLang="zh-TW" dirty="0"/>
+              <a:t>C:bug fix </a:t>
+            </a:r>
+            <a:r>
+              <a:rPr lang="zh-TW" altLang="en-US" dirty="0"/>
+              <a:t>版本，只修復 </a:t>
+            </a:r>
+            <a:r>
+              <a:rPr lang="en-US" altLang="zh-TW" dirty="0"/>
+              <a:t>bug</a:t>
+            </a:r>
+            <a:r>
+              <a:rPr lang="zh-TW" altLang="en-US" dirty="0"/>
+              <a:t>，無任何新的 </a:t>
+            </a:r>
+            <a:r>
+              <a:rPr lang="en-US" altLang="zh-TW" dirty="0"/>
+              <a:t>feature </a:t>
+            </a:r>
+            <a:r>
+              <a:rPr lang="zh-TW" altLang="en-US" dirty="0"/>
+              <a:t>加入</a:t>
+            </a:r>
+            <a:endParaRPr lang="en-US" altLang="zh-TW" dirty="0"/>
+          </a:p>
+          <a:p>
+            <a:r>
+              <a:rPr lang="zh-TW" altLang="en-US" dirty="0"/>
+              <a:t>發布了</a:t>
+            </a:r>
+            <a:r>
+              <a:rPr lang="en-US" altLang="zh-TW" dirty="0"/>
+              <a:t>2.9</a:t>
+            </a:r>
+            <a:r>
+              <a:rPr lang="zh-TW" altLang="en-US" dirty="0"/>
+              <a:t>，一般我們要去下載</a:t>
+            </a:r>
+            <a:r>
+              <a:rPr lang="en-US" altLang="zh-TW" dirty="0"/>
+              <a:t>2.9</a:t>
+            </a:r>
+            <a:r>
+              <a:rPr lang="zh-TW" altLang="en-US" dirty="0"/>
+              <a:t>版本的最新版本，比如</a:t>
+            </a:r>
+            <a:r>
+              <a:rPr lang="en-US" altLang="zh-TW" dirty="0"/>
+              <a:t>2.9.7</a:t>
+            </a:r>
+            <a:endParaRPr lang="zh-TW" altLang="en-US" dirty="0"/>
+          </a:p>
+        </p:txBody>
+      </p:sp>
+    </p:spTree>
+    <p:extLst>
+      <p:ext uri="{BB962C8B-B14F-4D97-AF65-F5344CB8AC3E}">
+        <p14:creationId xmlns:p14="http://schemas.microsoft.com/office/powerpoint/2010/main" val="1284939547"/>
+      </p:ext>
+    </p:extLst>
+  </p:cSld>
+  <p:clrMapOvr>
+    <a:masterClrMapping/>
+  </p:clrMapOvr>
+</p:sld>
+</file>
+
+<file path=ppt/slides/slide17.xml><?xml version="1.0" encoding="utf-8"?>
 <p:sld xmlns:a="http://schemas.openxmlformats.org/drawingml/2006/main" xmlns:r="http://schemas.openxmlformats.org/officeDocument/2006/relationships" xmlns:p="http://schemas.openxmlformats.org/presentationml/2006/main">
   <p:cSld>
     <p:spTree>
@@ -4166,194 +4705,6 @@
           <p:cNvPr id="2" name="標題 1">
             <a:extLst>
               <a:ext uri="{FF2B5EF4-FFF2-40B4-BE49-F238E27FC236}">
-                <a16:creationId xmlns:a16="http://schemas.microsoft.com/office/drawing/2014/main" id="{81E02953-EAB7-9E5A-DB89-39B0FFB4D6F6}"/>
-              </a:ext>
-            </a:extLst>
-          </p:cNvPr>
-          <p:cNvSpPr>
-            <a:spLocks noGrp="1"/>
-          </p:cNvSpPr>
-          <p:nvPr>
-            <p:ph type="title"/>
-          </p:nvPr>
-        </p:nvSpPr>
-        <p:spPr/>
-        <p:txBody>
-          <a:bodyPr/>
-          <a:lstStyle/>
-          <a:p>
-            <a:endParaRPr lang="zh-TW" altLang="en-US"/>
-          </a:p>
-        </p:txBody>
-      </p:sp>
-      <p:sp>
-        <p:nvSpPr>
-          <p:cNvPr id="3" name="內容版面配置區 2">
-            <a:extLst>
-              <a:ext uri="{FF2B5EF4-FFF2-40B4-BE49-F238E27FC236}">
-                <a16:creationId xmlns:a16="http://schemas.microsoft.com/office/drawing/2014/main" id="{39C54992-6ADC-F603-DD54-2B2D2B9DBAB4}"/>
-              </a:ext>
-            </a:extLst>
-          </p:cNvPr>
-          <p:cNvSpPr>
-            <a:spLocks noGrp="1"/>
-          </p:cNvSpPr>
-          <p:nvPr>
-            <p:ph idx="1"/>
-          </p:nvPr>
-        </p:nvSpPr>
-        <p:spPr/>
-        <p:txBody>
-          <a:bodyPr/>
-          <a:lstStyle/>
-          <a:p>
-            <a:r>
-              <a:rPr lang="en-US" altLang="zh-TW" dirty="0"/>
-              <a:t>git ls-files</a:t>
-            </a:r>
-          </a:p>
-          <a:p>
-            <a:r>
-              <a:rPr lang="en-US" altLang="zh-TW" dirty="0"/>
-              <a:t>git ls-files -s</a:t>
-            </a:r>
-            <a:endParaRPr lang="zh-TW" altLang="en-US" dirty="0"/>
-          </a:p>
-        </p:txBody>
-      </p:sp>
-    </p:spTree>
-    <p:extLst>
-      <p:ext uri="{BB962C8B-B14F-4D97-AF65-F5344CB8AC3E}">
-        <p14:creationId xmlns:p14="http://schemas.microsoft.com/office/powerpoint/2010/main" val="2190909539"/>
-      </p:ext>
-    </p:extLst>
-  </p:cSld>
-  <p:clrMapOvr>
-    <a:masterClrMapping/>
-  </p:clrMapOvr>
-</p:sld>
-</file>
-
-<file path=ppt/slides/slide6.xml><?xml version="1.0" encoding="utf-8"?>
-<p:sld xmlns:a="http://schemas.openxmlformats.org/drawingml/2006/main" xmlns:r="http://schemas.openxmlformats.org/officeDocument/2006/relationships" xmlns:p="http://schemas.openxmlformats.org/presentationml/2006/main">
-  <p:cSld>
-    <p:spTree>
-      <p:nvGrpSpPr>
-        <p:cNvPr id="1" name=""/>
-        <p:cNvGrpSpPr/>
-        <p:nvPr/>
-      </p:nvGrpSpPr>
-      <p:grpSpPr>
-        <a:xfrm>
-          <a:off x="0" y="0"/>
-          <a:ext cx="0" cy="0"/>
-          <a:chOff x="0" y="0"/>
-          <a:chExt cx="0" cy="0"/>
-        </a:xfrm>
-      </p:grpSpPr>
-      <p:sp>
-        <p:nvSpPr>
-          <p:cNvPr id="2" name="標題 1">
-            <a:extLst>
-              <a:ext uri="{FF2B5EF4-FFF2-40B4-BE49-F238E27FC236}">
-                <a16:creationId xmlns:a16="http://schemas.microsoft.com/office/drawing/2014/main" id="{08FFB9B3-AF50-155F-8140-E7889C6FDACB}"/>
-              </a:ext>
-            </a:extLst>
-          </p:cNvPr>
-          <p:cNvSpPr>
-            <a:spLocks noGrp="1"/>
-          </p:cNvSpPr>
-          <p:nvPr>
-            <p:ph type="title"/>
-          </p:nvPr>
-        </p:nvSpPr>
-        <p:spPr/>
-        <p:txBody>
-          <a:bodyPr/>
-          <a:lstStyle/>
-          <a:p>
-            <a:endParaRPr lang="zh-TW" altLang="en-US"/>
-          </a:p>
-        </p:txBody>
-      </p:sp>
-      <p:sp>
-        <p:nvSpPr>
-          <p:cNvPr id="3" name="內容版面配置區 2">
-            <a:extLst>
-              <a:ext uri="{FF2B5EF4-FFF2-40B4-BE49-F238E27FC236}">
-                <a16:creationId xmlns:a16="http://schemas.microsoft.com/office/drawing/2014/main" id="{327073AC-86AF-C41F-D1EF-F14A0B70B2CA}"/>
-              </a:ext>
-            </a:extLst>
-          </p:cNvPr>
-          <p:cNvSpPr>
-            <a:spLocks noGrp="1"/>
-          </p:cNvSpPr>
-          <p:nvPr>
-            <p:ph idx="1"/>
-          </p:nvPr>
-        </p:nvSpPr>
-        <p:spPr/>
-        <p:txBody>
-          <a:bodyPr/>
-          <a:lstStyle/>
-          <a:p>
-            <a:r>
-              <a:rPr lang="en-US" altLang="zh-TW" dirty="0"/>
-              <a:t>Docker =&gt; sha256</a:t>
-            </a:r>
-          </a:p>
-          <a:p>
-            <a:pPr lvl="1"/>
-            <a:r>
-              <a:rPr lang="en-US" altLang="zh-TW" dirty="0" err="1"/>
-              <a:t>dockerimage</a:t>
-            </a:r>
-            <a:endParaRPr lang="en-US" altLang="zh-TW" dirty="0"/>
-          </a:p>
-          <a:p>
-            <a:pPr lvl="1"/>
-            <a:r>
-              <a:rPr lang="en-US" altLang="zh-TW" dirty="0"/>
-              <a:t>container id</a:t>
-            </a:r>
-          </a:p>
-        </p:txBody>
-      </p:sp>
-    </p:spTree>
-    <p:extLst>
-      <p:ext uri="{BB962C8B-B14F-4D97-AF65-F5344CB8AC3E}">
-        <p14:creationId xmlns:p14="http://schemas.microsoft.com/office/powerpoint/2010/main" val="688929695"/>
-      </p:ext>
-    </p:extLst>
-  </p:cSld>
-  <p:clrMapOvr>
-    <a:masterClrMapping/>
-  </p:clrMapOvr>
-</p:sld>
-</file>
-
-<file path=ppt/slides/slide7.xml><?xml version="1.0" encoding="utf-8"?>
-<p:sld xmlns:a="http://schemas.openxmlformats.org/drawingml/2006/main" xmlns:r="http://schemas.openxmlformats.org/officeDocument/2006/relationships" xmlns:p="http://schemas.openxmlformats.org/presentationml/2006/main">
-  <p:cSld>
-    <p:spTree>
-      <p:nvGrpSpPr>
-        <p:cNvPr id="1" name=""/>
-        <p:cNvGrpSpPr/>
-        <p:nvPr/>
-      </p:nvGrpSpPr>
-      <p:grpSpPr>
-        <a:xfrm>
-          <a:off x="0" y="0"/>
-          <a:ext cx="0" cy="0"/>
-          <a:chOff x="0" y="0"/>
-          <a:chExt cx="0" cy="0"/>
-        </a:xfrm>
-      </p:grpSpPr>
-      <p:sp>
-        <p:nvSpPr>
-          <p:cNvPr id="2" name="標題 1">
-            <a:extLst>
-              <a:ext uri="{FF2B5EF4-FFF2-40B4-BE49-F238E27FC236}">
                 <a16:creationId xmlns:a16="http://schemas.microsoft.com/office/drawing/2014/main" id="{66D6E4DA-879F-B5A1-A0B7-A4134ABA0892}"/>
               </a:ext>
             </a:extLst>
@@ -4420,7 +4771,7 @@
 </p:sld>
 </file>
 
-<file path=ppt/slides/slide8.xml><?xml version="1.0" encoding="utf-8"?>
+<file path=ppt/slides/slide6.xml><?xml version="1.0" encoding="utf-8"?>
 <p:sld xmlns:a="http://schemas.openxmlformats.org/drawingml/2006/main" xmlns:r="http://schemas.openxmlformats.org/officeDocument/2006/relationships" xmlns:p="http://schemas.openxmlformats.org/presentationml/2006/main">
   <p:cSld>
     <p:spTree>
@@ -4508,7 +4859,7 @@
 </p:sld>
 </file>
 
-<file path=ppt/slides/slide9.xml><?xml version="1.0" encoding="utf-8"?>
+<file path=ppt/slides/slide7.xml><?xml version="1.0" encoding="utf-8"?>
 <p:sld xmlns:a="http://schemas.openxmlformats.org/drawingml/2006/main" xmlns:r="http://schemas.openxmlformats.org/officeDocument/2006/relationships" xmlns:p="http://schemas.openxmlformats.org/presentationml/2006/main">
   <p:cSld>
     <p:spTree>
@@ -4592,6 +4943,162 @@
     <p:extLst>
       <p:ext uri="{BB962C8B-B14F-4D97-AF65-F5344CB8AC3E}">
         <p14:creationId xmlns:p14="http://schemas.microsoft.com/office/powerpoint/2010/main" val="2563811398"/>
+      </p:ext>
+    </p:extLst>
+  </p:cSld>
+  <p:clrMapOvr>
+    <a:masterClrMapping/>
+  </p:clrMapOvr>
+</p:sld>
+</file>
+
+<file path=ppt/slides/slide8.xml><?xml version="1.0" encoding="utf-8"?>
+<p:sld xmlns:a="http://schemas.openxmlformats.org/drawingml/2006/main" xmlns:r="http://schemas.openxmlformats.org/officeDocument/2006/relationships" xmlns:p="http://schemas.openxmlformats.org/presentationml/2006/main">
+  <p:cSld>
+    <p:spTree>
+      <p:nvGrpSpPr>
+        <p:cNvPr id="1" name=""/>
+        <p:cNvGrpSpPr/>
+        <p:nvPr/>
+      </p:nvGrpSpPr>
+      <p:grpSpPr>
+        <a:xfrm>
+          <a:off x="0" y="0"/>
+          <a:ext cx="0" cy="0"/>
+          <a:chOff x="0" y="0"/>
+          <a:chExt cx="0" cy="0"/>
+        </a:xfrm>
+      </p:grpSpPr>
+      <p:sp>
+        <p:nvSpPr>
+          <p:cNvPr id="2" name="標題 1">
+            <a:extLst>
+              <a:ext uri="{FF2B5EF4-FFF2-40B4-BE49-F238E27FC236}">
+                <a16:creationId xmlns:a16="http://schemas.microsoft.com/office/drawing/2014/main" id="{83615992-28E3-8C03-33C0-92454F634206}"/>
+              </a:ext>
+            </a:extLst>
+          </p:cNvPr>
+          <p:cNvSpPr>
+            <a:spLocks noGrp="1"/>
+          </p:cNvSpPr>
+          <p:nvPr>
+            <p:ph type="title"/>
+          </p:nvPr>
+        </p:nvSpPr>
+        <p:spPr>
+          <a:xfrm>
+            <a:off x="838200" y="365125"/>
+            <a:ext cx="10515600" cy="753461"/>
+          </a:xfrm>
+        </p:spPr>
+        <p:txBody>
+          <a:bodyPr/>
+          <a:lstStyle/>
+          <a:p>
+            <a:r>
+              <a:rPr lang="en-US" altLang="zh-TW" dirty="0"/>
+              <a:t>Git </a:t>
+            </a:r>
+            <a:r>
+              <a:rPr lang="zh-TW" altLang="en-US" dirty="0"/>
+              <a:t>的文件狀態</a:t>
+            </a:r>
+          </a:p>
+        </p:txBody>
+      </p:sp>
+      <p:pic>
+        <p:nvPicPr>
+          <p:cNvPr id="5" name="內容版面配置區 4">
+            <a:extLst>
+              <a:ext uri="{FF2B5EF4-FFF2-40B4-BE49-F238E27FC236}">
+                <a16:creationId xmlns:a16="http://schemas.microsoft.com/office/drawing/2014/main" id="{6C18BB36-CAFE-8F97-7E83-DADDD8EB5CC2}"/>
+              </a:ext>
+            </a:extLst>
+          </p:cNvPr>
+          <p:cNvPicPr>
+            <a:picLocks noGrp="1" noChangeAspect="1"/>
+          </p:cNvPicPr>
+          <p:nvPr>
+            <p:ph idx="1"/>
+          </p:nvPr>
+        </p:nvPicPr>
+        <p:blipFill>
+          <a:blip r:embed="rId2"/>
+          <a:stretch>
+            <a:fillRect/>
+          </a:stretch>
+        </p:blipFill>
+        <p:spPr>
+          <a:xfrm>
+            <a:off x="1290637" y="1347788"/>
+            <a:ext cx="9610725" cy="4600575"/>
+          </a:xfrm>
+        </p:spPr>
+      </p:pic>
+    </p:spTree>
+    <p:extLst>
+      <p:ext uri="{BB962C8B-B14F-4D97-AF65-F5344CB8AC3E}">
+        <p14:creationId xmlns:p14="http://schemas.microsoft.com/office/powerpoint/2010/main" val="2289198793"/>
+      </p:ext>
+    </p:extLst>
+  </p:cSld>
+  <p:clrMapOvr>
+    <a:masterClrMapping/>
+  </p:clrMapOvr>
+</p:sld>
+</file>
+
+<file path=ppt/slides/slide9.xml><?xml version="1.0" encoding="utf-8"?>
+<p:sld xmlns:a="http://schemas.openxmlformats.org/drawingml/2006/main" xmlns:r="http://schemas.openxmlformats.org/officeDocument/2006/relationships" xmlns:p="http://schemas.openxmlformats.org/presentationml/2006/main">
+  <p:cSld>
+    <p:spTree>
+      <p:nvGrpSpPr>
+        <p:cNvPr id="1" name=""/>
+        <p:cNvGrpSpPr/>
+        <p:nvPr/>
+      </p:nvGrpSpPr>
+      <p:grpSpPr>
+        <a:xfrm>
+          <a:off x="0" y="0"/>
+          <a:ext cx="0" cy="0"/>
+          <a:chOff x="0" y="0"/>
+          <a:chExt cx="0" cy="0"/>
+        </a:xfrm>
+      </p:grpSpPr>
+      <p:pic>
+        <p:nvPicPr>
+          <p:cNvPr id="5" name="圖片 4">
+            <a:extLst>
+              <a:ext uri="{FF2B5EF4-FFF2-40B4-BE49-F238E27FC236}">
+                <a16:creationId xmlns:a16="http://schemas.microsoft.com/office/drawing/2014/main" id="{2BBB6C15-4CF5-DAC3-DCE1-C2FE2898D5A7}"/>
+              </a:ext>
+            </a:extLst>
+          </p:cNvPr>
+          <p:cNvPicPr>
+            <a:picLocks noChangeAspect="1"/>
+          </p:cNvPicPr>
+          <p:nvPr/>
+        </p:nvPicPr>
+        <p:blipFill>
+          <a:blip r:embed="rId2"/>
+          <a:stretch>
+            <a:fillRect/>
+          </a:stretch>
+        </p:blipFill>
+        <p:spPr>
+          <a:xfrm>
+            <a:off x="811644" y="772358"/>
+            <a:ext cx="10504056" cy="5280780"/>
+          </a:xfrm>
+          <a:prstGeom prst="rect">
+            <a:avLst/>
+          </a:prstGeom>
+        </p:spPr>
+      </p:pic>
+    </p:spTree>
+    <p:extLst>
+      <p:ext uri="{BB962C8B-B14F-4D97-AF65-F5344CB8AC3E}">
+        <p14:creationId xmlns:p14="http://schemas.microsoft.com/office/powerpoint/2010/main" val="2775296283"/>
       </p:ext>
     </p:extLst>
   </p:cSld>

</xml_diff>